<commit_message>
add export = FALSE option to flexchart
</commit_message>
<xml_diff>
--- a/benefits_charts/graduate_premiums.pptx
+++ b/benefits_charts/graduate_premiums.pptx
@@ -5,15 +5,21 @@
     <p:sldMasterId id="2147483682" r:id="rId1"/>
   </p:sldMasterIdLst>
   <p:notesMasterIdLst>
-    <p:notesMasterId r:id="rId8"/>
+    <p:notesMasterId r:id="rId11"/>
   </p:notesMasterIdLst>
+  <p:handoutMasterIdLst>
+    <p:handoutMasterId r:id="rId12"/>
+  </p:handoutMasterIdLst>
   <p:sldIdLst>
     <p:sldId id="256" r:id="rId2"/>
-    <p:sldId id="257" r:id="rId3"/>
-    <p:sldId id="258" r:id="rId4"/>
-    <p:sldId id="259" r:id="rId5"/>
-    <p:sldId id="260" r:id="rId6"/>
-    <p:sldId id="261" r:id="rId7"/>
+    <p:sldId id="263" r:id="rId3"/>
+    <p:sldId id="257" r:id="rId4"/>
+    <p:sldId id="258" r:id="rId5"/>
+    <p:sldId id="259" r:id="rId6"/>
+    <p:sldId id="260" r:id="rId7"/>
+    <p:sldId id="261" r:id="rId8"/>
+    <p:sldId id="624" r:id="rId9"/>
+    <p:sldId id="628" r:id="rId10"/>
   </p:sldIdLst>
   <p:sldSz cx="7977188" cy="5219700"/>
   <p:notesSz cx="9939338" cy="14368463"/>
@@ -1780,6 +1786,525 @@
 </c:chartSpace>
 </file>
 
+<file path=ppt/charts/chart10.xml><?xml version="1.0" encoding="utf-8"?>
+<c:chartSpace xmlns:c="http://schemas.openxmlformats.org/drawingml/2006/chart" xmlns:a="http://schemas.openxmlformats.org/drawingml/2006/main" xmlns:r="http://schemas.openxmlformats.org/officeDocument/2006/relationships" xmlns:c16r2="http://schemas.microsoft.com/office/drawing/2015/06/chart">
+  <c:date1904 val="0"/>
+  <c:lang val="en-US"/>
+  <c:roundedCorners val="0"/>
+  <mc:AlternateContent xmlns:mc="http://schemas.openxmlformats.org/markup-compatibility/2006">
+    <mc:Choice xmlns:c14="http://schemas.microsoft.com/office/drawing/2007/8/2/chart" Requires="c14">
+      <c14:style val="102"/>
+    </mc:Choice>
+    <mc:Fallback>
+      <c:style val="2"/>
+    </mc:Fallback>
+  </mc:AlternateContent>
+  <c:clrMapOvr bg1="lt1" tx1="dk1" bg2="lt2" tx2="dk2" accent1="accent1" accent2="accent2" accent3="accent3" accent4="accent4" accent5="accent5" accent6="accent6" hlink="hlink" folHlink="folHlink"/>
+  <c:chart>
+    <c:autoTitleDeleted val="1"/>
+    <c:plotArea>
+      <c:layout/>
+      <c:barChart>
+        <c:barDir val="col"/>
+        <c:grouping val="clustered"/>
+        <c:varyColors val="0"/>
+        <c:ser>
+          <c:idx val="0"/>
+          <c:order val="0"/>
+          <c:tx>
+            <c:strRef>
+              <c:f>Sheet1!$B$1</c:f>
+              <c:strCache>
+                <c:ptCount val="1"/>
+                <c:pt idx="0">
+                  <c:v>Un</c:v>
+                </c:pt>
+              </c:strCache>
+            </c:strRef>
+          </c:tx>
+          <c:spPr>
+            <a:solidFill>
+              <a:schemeClr val="tx2"/>
+            </a:solidFill>
+            <a:ln w="9525">
+              <a:solidFill>
+                <a:srgbClr val="FFFFFF"/>
+              </a:solidFill>
+            </a:ln>
+          </c:spPr>
+          <c:invertIfNegative val="0"/>
+          <c:cat>
+            <c:strRef>
+              <c:f>Sheet1!$A$2:$A$7</c:f>
+              <c:strCache>
+                <c:ptCount val="6"/>
+                <c:pt idx="0">
+                  <c:v>30-50</c:v>
+                </c:pt>
+                <c:pt idx="1">
+                  <c:v>50-60</c:v>
+                </c:pt>
+                <c:pt idx="2">
+                  <c:v>60-70</c:v>
+                </c:pt>
+                <c:pt idx="3">
+                  <c:v>70-80</c:v>
+                </c:pt>
+                <c:pt idx="4">
+                  <c:v>80-90</c:v>
+                </c:pt>
+                <c:pt idx="5">
+                  <c:v>90-100</c:v>
+                </c:pt>
+              </c:strCache>
+            </c:strRef>
+          </c:cat>
+          <c:val>
+            <c:numRef>
+              <c:f>Sheet1!$B$2:$B$7</c:f>
+              <c:numCache>
+                <c:formatCode>General</c:formatCode>
+                <c:ptCount val="6"/>
+                <c:pt idx="0">
+                  <c:v>20.192307692307693</c:v>
+                </c:pt>
+                <c:pt idx="1">
+                  <c:v>14.198912695874641</c:v>
+                </c:pt>
+                <c:pt idx="2">
+                  <c:v>13.381919677469375</c:v>
+                </c:pt>
+                <c:pt idx="3">
+                  <c:v>13.272777829270554</c:v>
+                </c:pt>
+                <c:pt idx="4">
+                  <c:v>11.71509520985702</c:v>
+                </c:pt>
+                <c:pt idx="5">
+                  <c:v>9.965928449744462</c:v>
+                </c:pt>
+              </c:numCache>
+            </c:numRef>
+          </c:val>
+          <c:extLst>
+            <c:ext xmlns:c16="http://schemas.microsoft.com/office/drawing/2014/chart" uri="{C3380CC4-5D6E-409C-BE32-E72D297353CC}">
+              <c16:uniqueId val="{00000004-5A34-4138-B5E6-26F4B8707154}"/>
+            </c:ext>
+          </c:extLst>
+        </c:ser>
+        <c:dLbls>
+          <c:showLegendKey val="0"/>
+          <c:showVal val="0"/>
+          <c:showCatName val="0"/>
+          <c:showSerName val="0"/>
+          <c:showPercent val="0"/>
+          <c:showBubbleSize val="0"/>
+        </c:dLbls>
+        <c:gapWidth val="100"/>
+        <c:axId val="324265856"/>
+        <c:axId val="327427200"/>
+      </c:barChart>
+      <c:catAx>
+        <c:axId val="324265856"/>
+        <c:scaling>
+          <c:orientation val="minMax"/>
+        </c:scaling>
+        <c:delete val="0"/>
+        <c:axPos val="b"/>
+        <c:numFmt formatCode="General" sourceLinked="1"/>
+        <c:majorTickMark val="none"/>
+        <c:minorTickMark val="none"/>
+        <c:tickLblPos val="nextTo"/>
+        <c:spPr>
+          <a:ln>
+            <a:solidFill>
+              <a:schemeClr val="tx1"/>
+            </a:solidFill>
+          </a:ln>
+        </c:spPr>
+        <c:txPr>
+          <a:bodyPr/>
+          <a:lstStyle/>
+          <a:p>
+            <a:pPr>
+              <a:defRPr sz="1800"/>
+            </a:pPr>
+            <a:endParaRPr lang="en-US"/>
+          </a:p>
+        </c:txPr>
+        <c:crossAx val="327427200"/>
+        <c:crosses val="autoZero"/>
+        <c:auto val="1"/>
+        <c:lblAlgn val="ctr"/>
+        <c:lblOffset val="100"/>
+        <c:noMultiLvlLbl val="0"/>
+      </c:catAx>
+      <c:valAx>
+        <c:axId val="327427200"/>
+        <c:scaling>
+          <c:orientation val="minMax"/>
+          <c:max val="20.5"/>
+          <c:min val="0"/>
+        </c:scaling>
+        <c:delete val="0"/>
+        <c:axPos val="l"/>
+        <c:majorGridlines>
+          <c:spPr>
+            <a:ln>
+              <a:solidFill>
+                <a:schemeClr val="accent6">
+                  <a:lumMod val="60000"/>
+                  <a:lumOff val="40000"/>
+                </a:schemeClr>
+              </a:solidFill>
+            </a:ln>
+          </c:spPr>
+        </c:majorGridlines>
+        <c:numFmt formatCode="General" sourceLinked="1"/>
+        <c:majorTickMark val="out"/>
+        <c:minorTickMark val="none"/>
+        <c:tickLblPos val="nextTo"/>
+        <c:spPr>
+          <a:ln>
+            <a:noFill/>
+          </a:ln>
+        </c:spPr>
+        <c:txPr>
+          <a:bodyPr/>
+          <a:lstStyle/>
+          <a:p>
+            <a:pPr>
+              <a:defRPr sz="1800"/>
+            </a:pPr>
+            <a:endParaRPr lang="en-US"/>
+          </a:p>
+        </c:txPr>
+        <c:crossAx val="324265856"/>
+        <c:crosses val="autoZero"/>
+        <c:crossBetween val="between"/>
+      </c:valAx>
+    </c:plotArea>
+    <c:plotVisOnly val="1"/>
+    <c:dispBlanksAs val="gap"/>
+    <c:showDLblsOverMax val="0"/>
+  </c:chart>
+  <c:txPr>
+    <a:bodyPr/>
+    <a:lstStyle/>
+    <a:p>
+      <a:pPr>
+        <a:defRPr sz="1800"/>
+      </a:pPr>
+      <a:endParaRPr lang="en-US"/>
+    </a:p>
+  </c:txPr>
+  <c:externalData r:id="rId2">
+    <c:autoUpdate val="0"/>
+  </c:externalData>
+</c:chartSpace>
+</file>
+
+<file path=ppt/charts/chart11.xml><?xml version="1.0" encoding="utf-8"?>
+<c:chartSpace xmlns:c="http://schemas.openxmlformats.org/drawingml/2006/chart" xmlns:a="http://schemas.openxmlformats.org/drawingml/2006/main" xmlns:r="http://schemas.openxmlformats.org/officeDocument/2006/relationships" xmlns:c16r2="http://schemas.microsoft.com/office/drawing/2015/06/chart">
+  <c:date1904 val="0"/>
+  <c:lang val="en-US"/>
+  <c:roundedCorners val="0"/>
+  <mc:AlternateContent xmlns:mc="http://schemas.openxmlformats.org/markup-compatibility/2006">
+    <mc:Choice xmlns:c14="http://schemas.microsoft.com/office/drawing/2007/8/2/chart" Requires="c14">
+      <c14:style val="102"/>
+    </mc:Choice>
+    <mc:Fallback>
+      <c:style val="2"/>
+    </mc:Fallback>
+  </mc:AlternateContent>
+  <c:clrMapOvr bg1="lt1" tx1="dk1" bg2="lt2" tx2="dk2" accent1="accent1" accent2="accent2" accent3="accent3" accent4="accent4" accent5="accent5" accent6="accent6" hlink="hlink" folHlink="folHlink"/>
+  <c:chart>
+    <c:autoTitleDeleted val="0"/>
+    <c:plotArea>
+      <c:layout/>
+      <c:barChart>
+        <c:barDir val="col"/>
+        <c:grouping val="stacked"/>
+        <c:varyColors val="0"/>
+        <c:ser>
+          <c:idx val="0"/>
+          <c:order val="0"/>
+          <c:tx>
+            <c:strRef>
+              <c:f>Sheet1!$B$1</c:f>
+              <c:strCache>
+                <c:ptCount val="1"/>
+                <c:pt idx="0">
+                  <c:v>Un</c:v>
+                </c:pt>
+              </c:strCache>
+            </c:strRef>
+          </c:tx>
+          <c:spPr>
+            <a:solidFill>
+              <a:srgbClr val="A02226"/>
+            </a:solidFill>
+            <a:ln w="9525">
+              <a:solidFill>
+                <a:srgbClr val="FFFFFF"/>
+              </a:solidFill>
+            </a:ln>
+          </c:spPr>
+          <c:invertIfNegative val="0"/>
+          <c:cat>
+            <c:strRef>
+              <c:f>Sheet1!$A$2:$A$7</c:f>
+              <c:strCache>
+                <c:ptCount val="6"/>
+                <c:pt idx="0">
+                  <c:v>30-50</c:v>
+                </c:pt>
+                <c:pt idx="1">
+                  <c:v>50-60</c:v>
+                </c:pt>
+                <c:pt idx="2">
+                  <c:v>60-70</c:v>
+                </c:pt>
+                <c:pt idx="3">
+                  <c:v>70-80</c:v>
+                </c:pt>
+                <c:pt idx="4">
+                  <c:v>80-90</c:v>
+                </c:pt>
+                <c:pt idx="5">
+                  <c:v>90-100</c:v>
+                </c:pt>
+              </c:strCache>
+            </c:strRef>
+          </c:cat>
+          <c:val>
+            <c:numRef>
+              <c:f>Sheet1!$B$2:$B$7</c:f>
+              <c:numCache>
+                <c:formatCode>General</c:formatCode>
+                <c:ptCount val="6"/>
+                <c:pt idx="0">
+                  <c:v>20.192307692307693</c:v>
+                </c:pt>
+                <c:pt idx="1">
+                  <c:v>14.198912695874641</c:v>
+                </c:pt>
+                <c:pt idx="2">
+                  <c:v>13.381919677469375</c:v>
+                </c:pt>
+                <c:pt idx="3">
+                  <c:v>13.272777829270554</c:v>
+                </c:pt>
+                <c:pt idx="4">
+                  <c:v>11.71509520985702</c:v>
+                </c:pt>
+                <c:pt idx="5">
+                  <c:v>9.965928449744462</c:v>
+                </c:pt>
+              </c:numCache>
+            </c:numRef>
+          </c:val>
+          <c:extLst>
+            <c:ext xmlns:c16="http://schemas.microsoft.com/office/drawing/2014/chart" uri="{C3380CC4-5D6E-409C-BE32-E72D297353CC}">
+              <c16:uniqueId val="{00000004-E863-4826-BE0B-3F0E5DB61A77}"/>
+            </c:ext>
+          </c:extLst>
+        </c:ser>
+        <c:ser>
+          <c:idx val="1"/>
+          <c:order val="1"/>
+          <c:tx>
+            <c:strRef>
+              <c:f>Sheet1!$C$1</c:f>
+              <c:strCache>
+                <c:ptCount val="1"/>
+                <c:pt idx="0">
+                  <c:v>Under</c:v>
+                </c:pt>
+              </c:strCache>
+            </c:strRef>
+          </c:tx>
+          <c:spPr>
+            <a:solidFill>
+              <a:srgbClr val="D4582A"/>
+            </a:solidFill>
+            <a:ln w="9525">
+              <a:solidFill>
+                <a:srgbClr val="FFFFFF"/>
+              </a:solidFill>
+            </a:ln>
+          </c:spPr>
+          <c:invertIfNegative val="0"/>
+          <c:cat>
+            <c:strRef>
+              <c:f>Sheet1!$A$2:$A$7</c:f>
+              <c:strCache>
+                <c:ptCount val="6"/>
+                <c:pt idx="0">
+                  <c:v>30-50</c:v>
+                </c:pt>
+                <c:pt idx="1">
+                  <c:v>50-60</c:v>
+                </c:pt>
+                <c:pt idx="2">
+                  <c:v>60-70</c:v>
+                </c:pt>
+                <c:pt idx="3">
+                  <c:v>70-80</c:v>
+                </c:pt>
+                <c:pt idx="4">
+                  <c:v>80-90</c:v>
+                </c:pt>
+                <c:pt idx="5">
+                  <c:v>90-100</c:v>
+                </c:pt>
+              </c:strCache>
+            </c:strRef>
+          </c:cat>
+          <c:val>
+            <c:numRef>
+              <c:f>Sheet1!$C$2:$C$7</c:f>
+              <c:numCache>
+                <c:formatCode>General</c:formatCode>
+                <c:ptCount val="6"/>
+                <c:pt idx="0">
+                  <c:v>17.371794871794872</c:v>
+                </c:pt>
+                <c:pt idx="1">
+                  <c:v>19.219699392388868</c:v>
+                </c:pt>
+                <c:pt idx="2">
+                  <c:v>19.072724453403627</c:v>
+                </c:pt>
+                <c:pt idx="3">
+                  <c:v>17.990545926406526</c:v>
+                </c:pt>
+                <c:pt idx="4">
+                  <c:v>17.737365750807143</c:v>
+                </c:pt>
+                <c:pt idx="5">
+                  <c:v>13.429869392390687</c:v>
+                </c:pt>
+              </c:numCache>
+            </c:numRef>
+          </c:val>
+          <c:extLst>
+            <c:ext xmlns:c16="http://schemas.microsoft.com/office/drawing/2014/chart" uri="{C3380CC4-5D6E-409C-BE32-E72D297353CC}">
+              <c16:uniqueId val="{00000006-E863-4826-BE0B-3F0E5DB61A77}"/>
+            </c:ext>
+          </c:extLst>
+        </c:ser>
+        <c:dLbls>
+          <c:showLegendKey val="0"/>
+          <c:showVal val="0"/>
+          <c:showCatName val="0"/>
+          <c:showSerName val="0"/>
+          <c:showPercent val="0"/>
+          <c:showBubbleSize val="0"/>
+        </c:dLbls>
+        <c:gapWidth val="100"/>
+        <c:overlap val="100"/>
+        <c:axId val="331915264"/>
+        <c:axId val="331917184"/>
+      </c:barChart>
+      <c:catAx>
+        <c:axId val="331915264"/>
+        <c:scaling>
+          <c:orientation val="minMax"/>
+        </c:scaling>
+        <c:delete val="0"/>
+        <c:axPos val="b"/>
+        <c:numFmt formatCode="General" sourceLinked="1"/>
+        <c:majorTickMark val="none"/>
+        <c:minorTickMark val="none"/>
+        <c:tickLblPos val="nextTo"/>
+        <c:spPr>
+          <a:ln>
+            <a:solidFill>
+              <a:schemeClr val="tx1"/>
+            </a:solidFill>
+          </a:ln>
+        </c:spPr>
+        <c:txPr>
+          <a:bodyPr/>
+          <a:lstStyle/>
+          <a:p>
+            <a:pPr>
+              <a:defRPr sz="1800"/>
+            </a:pPr>
+            <a:endParaRPr lang="en-US"/>
+          </a:p>
+        </c:txPr>
+        <c:crossAx val="331917184"/>
+        <c:crosses val="autoZero"/>
+        <c:auto val="1"/>
+        <c:lblAlgn val="ctr"/>
+        <c:lblOffset val="100"/>
+        <c:noMultiLvlLbl val="0"/>
+      </c:catAx>
+      <c:valAx>
+        <c:axId val="331917184"/>
+        <c:scaling>
+          <c:orientation val="minMax"/>
+        </c:scaling>
+        <c:delete val="0"/>
+        <c:axPos val="l"/>
+        <c:majorGridlines>
+          <c:spPr>
+            <a:ln>
+              <a:solidFill>
+                <a:schemeClr val="accent6">
+                  <a:lumMod val="60000"/>
+                  <a:lumOff val="40000"/>
+                </a:schemeClr>
+              </a:solidFill>
+            </a:ln>
+          </c:spPr>
+        </c:majorGridlines>
+        <c:numFmt formatCode="General" sourceLinked="0"/>
+        <c:majorTickMark val="out"/>
+        <c:minorTickMark val="none"/>
+        <c:tickLblPos val="nextTo"/>
+        <c:spPr>
+          <a:ln>
+            <a:noFill/>
+          </a:ln>
+        </c:spPr>
+        <c:txPr>
+          <a:bodyPr/>
+          <a:lstStyle/>
+          <a:p>
+            <a:pPr>
+              <a:defRPr sz="1800"/>
+            </a:pPr>
+            <a:endParaRPr lang="en-US"/>
+          </a:p>
+        </c:txPr>
+        <c:crossAx val="331915264"/>
+        <c:crosses val="autoZero"/>
+        <c:crossBetween val="between"/>
+      </c:valAx>
+    </c:plotArea>
+    <c:plotVisOnly val="1"/>
+    <c:dispBlanksAs val="gap"/>
+    <c:showDLblsOverMax val="0"/>
+  </c:chart>
+  <c:txPr>
+    <a:bodyPr/>
+    <a:lstStyle/>
+    <a:p>
+      <a:pPr>
+        <a:defRPr sz="1800"/>
+      </a:pPr>
+      <a:endParaRPr lang="en-US"/>
+    </a:p>
+  </c:txPr>
+  <c:externalData r:id="rId2">
+    <c:autoUpdate val="0"/>
+  </c:externalData>
+</c:chartSpace>
+</file>
+
 <file path=ppt/charts/chart2.xml><?xml version="1.0" encoding="utf-8"?>
 <c:chartSpace xmlns:c="http://schemas.openxmlformats.org/drawingml/2006/chart" xmlns:a="http://schemas.openxmlformats.org/drawingml/2006/main" xmlns:r="http://schemas.openxmlformats.org/officeDocument/2006/relationships" xmlns:c16r2="http://schemas.microsoft.com/office/drawing/2015/06/chart">
   <c:date1904 val="0"/>
@@ -3382,6 +3907,392 @@
   <c:chart>
     <c:autoTitleDeleted val="0"/>
     <c:plotArea>
+      <c:layout/>
+      <c:barChart>
+        <c:barDir val="bar"/>
+        <c:grouping val="clustered"/>
+        <c:varyColors val="0"/>
+        <c:ser>
+          <c:idx val="0"/>
+          <c:order val="0"/>
+          <c:tx>
+            <c:strRef>
+              <c:f>Sheet1!$B$1</c:f>
+              <c:strCache>
+                <c:ptCount val="1"/>
+                <c:pt idx="0">
+                  <c:v>Male</c:v>
+                </c:pt>
+              </c:strCache>
+            </c:strRef>
+          </c:tx>
+          <c:spPr>
+            <a:solidFill>
+              <a:srgbClr val="A02226"/>
+            </a:solidFill>
+            <a:ln w="9525">
+              <a:solidFill>
+                <a:srgbClr val="FFFFFF"/>
+              </a:solidFill>
+            </a:ln>
+          </c:spPr>
+          <c:invertIfNegative val="0"/>
+          <c:cat>
+            <c:strRef>
+              <c:f>Sheet1!$A$2:$A$14</c:f>
+              <c:strCache>
+                <c:ptCount val="13"/>
+                <c:pt idx="0">
+                  <c:v>Agriculture</c:v>
+                </c:pt>
+                <c:pt idx="1">
+                  <c:v>Architecture</c:v>
+                </c:pt>
+                <c:pt idx="2">
+                  <c:v>Performing arts</c:v>
+                </c:pt>
+                <c:pt idx="3">
+                  <c:v>Medical</c:v>
+                </c:pt>
+                <c:pt idx="4">
+                  <c:v>IT</c:v>
+                </c:pt>
+                <c:pt idx="5">
+                  <c:v>Humanities</c:v>
+                </c:pt>
+                <c:pt idx="6">
+                  <c:v>Engineering</c:v>
+                </c:pt>
+                <c:pt idx="7">
+                  <c:v>Nursing</c:v>
+                </c:pt>
+                <c:pt idx="8">
+                  <c:v>Education</c:v>
+                </c:pt>
+                <c:pt idx="9">
+                  <c:v>Science</c:v>
+                </c:pt>
+                <c:pt idx="10">
+                  <c:v>Other health</c:v>
+                </c:pt>
+                <c:pt idx="11">
+                  <c:v>Commerce</c:v>
+                </c:pt>
+                <c:pt idx="12">
+                  <c:v>Society &amp; culture</c:v>
+                </c:pt>
+              </c:strCache>
+            </c:strRef>
+          </c:cat>
+          <c:val>
+            <c:numRef>
+              <c:f>Sheet1!$B$2:$B$14</c:f>
+              <c:numCache>
+                <c:formatCode>#,##0.0</c:formatCode>
+                <c:ptCount val="13"/>
+                <c:pt idx="0">
+                  <c:v>1.5069999999999999</c:v>
+                </c:pt>
+                <c:pt idx="1">
+                  <c:v>1.9770000000000001</c:v>
+                </c:pt>
+                <c:pt idx="2">
+                  <c:v>4.2859999999999996</c:v>
+                </c:pt>
+                <c:pt idx="3">
+                  <c:v>4.101</c:v>
+                </c:pt>
+                <c:pt idx="4">
+                  <c:v>19.141999999999999</c:v>
+                </c:pt>
+                <c:pt idx="5">
+                  <c:v>10.257999999999999</c:v>
+                </c:pt>
+                <c:pt idx="6">
+                  <c:v>42.329000000000001</c:v>
+                </c:pt>
+                <c:pt idx="7">
+                  <c:v>6.8739999999999997</c:v>
+                </c:pt>
+                <c:pt idx="8">
+                  <c:v>15.949</c:v>
+                </c:pt>
+                <c:pt idx="9">
+                  <c:v>34.851999999999997</c:v>
+                </c:pt>
+                <c:pt idx="10">
+                  <c:v>25.280999999999999</c:v>
+                </c:pt>
+                <c:pt idx="11">
+                  <c:v>60.08</c:v>
+                </c:pt>
+                <c:pt idx="12">
+                  <c:v>50.213000000000001</c:v>
+                </c:pt>
+              </c:numCache>
+            </c:numRef>
+          </c:val>
+          <c:extLst>
+            <c:ext xmlns:c16="http://schemas.microsoft.com/office/drawing/2014/chart" uri="{C3380CC4-5D6E-409C-BE32-E72D297353CC}">
+              <c16:uniqueId val="{00000004-DEB2-4D56-9DA7-FE1AF632FA3A}"/>
+            </c:ext>
+          </c:extLst>
+        </c:ser>
+        <c:ser>
+          <c:idx val="1"/>
+          <c:order val="1"/>
+          <c:tx>
+            <c:strRef>
+              <c:f>Sheet1!$C$1</c:f>
+              <c:strCache>
+                <c:ptCount val="1"/>
+                <c:pt idx="0">
+                  <c:v>Female</c:v>
+                </c:pt>
+              </c:strCache>
+            </c:strRef>
+          </c:tx>
+          <c:spPr>
+            <a:solidFill>
+              <a:srgbClr val="F68B33"/>
+            </a:solidFill>
+            <a:ln w="9525">
+              <a:solidFill>
+                <a:srgbClr val="FFFFFF"/>
+              </a:solidFill>
+            </a:ln>
+          </c:spPr>
+          <c:invertIfNegative val="0"/>
+          <c:cat>
+            <c:strRef>
+              <c:f>Sheet1!$A$2:$A$14</c:f>
+              <c:strCache>
+                <c:ptCount val="13"/>
+                <c:pt idx="0">
+                  <c:v>Agriculture</c:v>
+                </c:pt>
+                <c:pt idx="1">
+                  <c:v>Architecture</c:v>
+                </c:pt>
+                <c:pt idx="2">
+                  <c:v>Performing arts</c:v>
+                </c:pt>
+                <c:pt idx="3">
+                  <c:v>Medical</c:v>
+                </c:pt>
+                <c:pt idx="4">
+                  <c:v>IT</c:v>
+                </c:pt>
+                <c:pt idx="5">
+                  <c:v>Humanities</c:v>
+                </c:pt>
+                <c:pt idx="6">
+                  <c:v>Engineering</c:v>
+                </c:pt>
+                <c:pt idx="7">
+                  <c:v>Nursing</c:v>
+                </c:pt>
+                <c:pt idx="8">
+                  <c:v>Education</c:v>
+                </c:pt>
+                <c:pt idx="9">
+                  <c:v>Science</c:v>
+                </c:pt>
+                <c:pt idx="10">
+                  <c:v>Other health</c:v>
+                </c:pt>
+                <c:pt idx="11">
+                  <c:v>Commerce</c:v>
+                </c:pt>
+                <c:pt idx="12">
+                  <c:v>Society &amp; culture</c:v>
+                </c:pt>
+              </c:strCache>
+            </c:strRef>
+          </c:cat>
+          <c:val>
+            <c:numRef>
+              <c:f>Sheet1!$C$2:$C$14</c:f>
+              <c:numCache>
+                <c:formatCode>#,##0.0</c:formatCode>
+                <c:ptCount val="13"/>
+                <c:pt idx="0">
+                  <c:v>1.8540000000000001</c:v>
+                </c:pt>
+                <c:pt idx="1">
+                  <c:v>1.429</c:v>
+                </c:pt>
+                <c:pt idx="2">
+                  <c:v>4.3019999999999996</c:v>
+                </c:pt>
+                <c:pt idx="3">
+                  <c:v>4.5460000000000003</c:v>
+                </c:pt>
+                <c:pt idx="4">
+                  <c:v>2.859</c:v>
+                </c:pt>
+                <c:pt idx="5">
+                  <c:v>16.044</c:v>
+                </c:pt>
+                <c:pt idx="6">
+                  <c:v>7.2039999999999997</c:v>
+                </c:pt>
+                <c:pt idx="7">
+                  <c:v>49.225000000000001</c:v>
+                </c:pt>
+                <c:pt idx="8">
+                  <c:v>53.234000000000002</c:v>
+                </c:pt>
+                <c:pt idx="9">
+                  <c:v>37.173000000000002</c:v>
+                </c:pt>
+                <c:pt idx="10">
+                  <c:v>48.042999999999999</c:v>
+                </c:pt>
+                <c:pt idx="11">
+                  <c:v>54.792999999999999</c:v>
+                </c:pt>
+                <c:pt idx="12">
+                  <c:v>106.60299999999999</c:v>
+                </c:pt>
+              </c:numCache>
+            </c:numRef>
+          </c:val>
+          <c:extLst>
+            <c:ext xmlns:c16="http://schemas.microsoft.com/office/drawing/2014/chart" uri="{C3380CC4-5D6E-409C-BE32-E72D297353CC}">
+              <c16:uniqueId val="{00000006-DEB2-4D56-9DA7-FE1AF632FA3A}"/>
+            </c:ext>
+          </c:extLst>
+        </c:ser>
+        <c:dLbls>
+          <c:showLegendKey val="0"/>
+          <c:showVal val="0"/>
+          <c:showCatName val="0"/>
+          <c:showSerName val="0"/>
+          <c:showPercent val="0"/>
+          <c:showBubbleSize val="0"/>
+        </c:dLbls>
+        <c:gapWidth val="60"/>
+        <c:axId val="342402176"/>
+        <c:axId val="342778624"/>
+      </c:barChart>
+      <c:catAx>
+        <c:axId val="342402176"/>
+        <c:scaling>
+          <c:orientation val="minMax"/>
+        </c:scaling>
+        <c:delete val="0"/>
+        <c:axPos val="l"/>
+        <c:numFmt formatCode="General" sourceLinked="1"/>
+        <c:majorTickMark val="none"/>
+        <c:minorTickMark val="none"/>
+        <c:tickLblPos val="nextTo"/>
+        <c:spPr>
+          <a:ln>
+            <a:solidFill>
+              <a:schemeClr val="tx1"/>
+            </a:solidFill>
+          </a:ln>
+        </c:spPr>
+        <c:txPr>
+          <a:bodyPr/>
+          <a:lstStyle/>
+          <a:p>
+            <a:pPr>
+              <a:defRPr sz="1800"/>
+            </a:pPr>
+            <a:endParaRPr lang="en-US"/>
+          </a:p>
+        </c:txPr>
+        <c:crossAx val="342778624"/>
+        <c:crosses val="autoZero"/>
+        <c:auto val="1"/>
+        <c:lblAlgn val="ctr"/>
+        <c:lblOffset val="100"/>
+        <c:noMultiLvlLbl val="0"/>
+      </c:catAx>
+      <c:valAx>
+        <c:axId val="342778624"/>
+        <c:scaling>
+          <c:orientation val="minMax"/>
+          <c:max val="110"/>
+          <c:min val="0"/>
+        </c:scaling>
+        <c:delete val="0"/>
+        <c:axPos val="b"/>
+        <c:majorGridlines>
+          <c:spPr>
+            <a:ln>
+              <a:solidFill>
+                <a:schemeClr val="accent6">
+                  <a:lumMod val="60000"/>
+                  <a:lumOff val="40000"/>
+                </a:schemeClr>
+              </a:solidFill>
+            </a:ln>
+          </c:spPr>
+        </c:majorGridlines>
+        <c:numFmt formatCode="General" sourceLinked="0"/>
+        <c:majorTickMark val="out"/>
+        <c:minorTickMark val="none"/>
+        <c:tickLblPos val="nextTo"/>
+        <c:spPr>
+          <a:ln>
+            <a:noFill/>
+          </a:ln>
+        </c:spPr>
+        <c:txPr>
+          <a:bodyPr/>
+          <a:lstStyle/>
+          <a:p>
+            <a:pPr>
+              <a:defRPr sz="1800"/>
+            </a:pPr>
+            <a:endParaRPr lang="en-US"/>
+          </a:p>
+        </c:txPr>
+        <c:crossAx val="342402176"/>
+        <c:crosses val="autoZero"/>
+        <c:crossBetween val="between"/>
+      </c:valAx>
+    </c:plotArea>
+    <c:plotVisOnly val="1"/>
+    <c:dispBlanksAs val="gap"/>
+    <c:showDLblsOverMax val="0"/>
+  </c:chart>
+  <c:txPr>
+    <a:bodyPr/>
+    <a:lstStyle/>
+    <a:p>
+      <a:pPr>
+        <a:defRPr sz="1800"/>
+      </a:pPr>
+      <a:endParaRPr lang="en-US"/>
+    </a:p>
+  </c:txPr>
+  <c:externalData r:id="rId2">
+    <c:autoUpdate val="0"/>
+  </c:externalData>
+</c:chartSpace>
+</file>
+
+<file path=ppt/charts/chart4.xml><?xml version="1.0" encoding="utf-8"?>
+<c:chartSpace xmlns:c="http://schemas.openxmlformats.org/drawingml/2006/chart" xmlns:a="http://schemas.openxmlformats.org/drawingml/2006/main" xmlns:r="http://schemas.openxmlformats.org/officeDocument/2006/relationships" xmlns:c16r2="http://schemas.microsoft.com/office/drawing/2015/06/chart">
+  <c:date1904 val="0"/>
+  <c:lang val="en-US"/>
+  <c:roundedCorners val="0"/>
+  <mc:AlternateContent xmlns:mc="http://schemas.openxmlformats.org/markup-compatibility/2006">
+    <mc:Choice xmlns:c14="http://schemas.microsoft.com/office/drawing/2007/8/2/chart" Requires="c14">
+      <c14:style val="102"/>
+    </mc:Choice>
+    <mc:Fallback>
+      <c:style val="2"/>
+    </mc:Fallback>
+  </mc:AlternateContent>
+  <c:clrMapOvr bg1="lt1" tx1="dk1" bg2="lt2" tx2="dk2" accent1="accent1" accent2="accent2" accent3="accent3" accent4="accent4" accent5="accent5" accent6="accent6" hlink="hlink" folHlink="folHlink"/>
+  <c:chart>
+    <c:autoTitleDeleted val="0"/>
+    <c:plotArea>
       <c:layout>
         <c:manualLayout>
           <c:layoutTarget val="inner"/>
@@ -5278,7 +6189,7 @@
 </c:chartSpace>
 </file>
 
-<file path=ppt/charts/chart4.xml><?xml version="1.0" encoding="utf-8"?>
+<file path=ppt/charts/chart5.xml><?xml version="1.0" encoding="utf-8"?>
 <c:chartSpace xmlns:c="http://schemas.openxmlformats.org/drawingml/2006/chart" xmlns:a="http://schemas.openxmlformats.org/drawingml/2006/main" xmlns:r="http://schemas.openxmlformats.org/officeDocument/2006/relationships" xmlns:c16r2="http://schemas.microsoft.com/office/drawing/2015/06/chart">
   <c:date1904 val="0"/>
   <c:lang val="en-US"/>
@@ -7199,7 +8110,7 @@
 </c:chartSpace>
 </file>
 
-<file path=ppt/charts/chart5.xml><?xml version="1.0" encoding="utf-8"?>
+<file path=ppt/charts/chart6.xml><?xml version="1.0" encoding="utf-8"?>
 <c:chartSpace xmlns:c="http://schemas.openxmlformats.org/drawingml/2006/chart" xmlns:a="http://schemas.openxmlformats.org/drawingml/2006/main" xmlns:r="http://schemas.openxmlformats.org/officeDocument/2006/relationships" xmlns:c16r2="http://schemas.microsoft.com/office/drawing/2015/06/chart">
   <c:date1904 val="0"/>
   <c:lang val="en-US"/>
@@ -7763,7 +8674,7 @@
 </c:chartSpace>
 </file>
 
-<file path=ppt/charts/chart6.xml><?xml version="1.0" encoding="utf-8"?>
+<file path=ppt/charts/chart7.xml><?xml version="1.0" encoding="utf-8"?>
 <c:chartSpace xmlns:c="http://schemas.openxmlformats.org/drawingml/2006/chart" xmlns:a="http://schemas.openxmlformats.org/drawingml/2006/main" xmlns:r="http://schemas.openxmlformats.org/officeDocument/2006/relationships" xmlns:c16r2="http://schemas.microsoft.com/office/drawing/2015/06/chart">
   <c:date1904 val="0"/>
   <c:lang val="en-US"/>
@@ -8084,7 +8995,7 @@
 </c:chartSpace>
 </file>
 
-<file path=ppt/charts/chart7.xml><?xml version="1.0" encoding="utf-8"?>
+<file path=ppt/charts/chart8.xml><?xml version="1.0" encoding="utf-8"?>
 <c:chartSpace xmlns:c="http://schemas.openxmlformats.org/drawingml/2006/chart" xmlns:a="http://schemas.openxmlformats.org/drawingml/2006/main" xmlns:r="http://schemas.openxmlformats.org/officeDocument/2006/relationships" xmlns:c16r2="http://schemas.microsoft.com/office/drawing/2015/06/chart">
   <c:date1904 val="0"/>
   <c:lang val="en-US"/>
@@ -8384,7 +9295,7 @@
 </c:chartSpace>
 </file>
 
-<file path=ppt/charts/chart8.xml><?xml version="1.0" encoding="utf-8"?>
+<file path=ppt/charts/chart9.xml><?xml version="1.0" encoding="utf-8"?>
 <c:chartSpace xmlns:c="http://schemas.openxmlformats.org/drawingml/2006/chart" xmlns:a="http://schemas.openxmlformats.org/drawingml/2006/main" xmlns:r="http://schemas.openxmlformats.org/officeDocument/2006/relationships" xmlns:c16r2="http://schemas.microsoft.com/office/drawing/2015/06/chart">
   <c:date1904 val="0"/>
   <c:lang val="en-US"/>
@@ -9181,6 +10092,195 @@
     <c:autoUpdate val="0"/>
   </c:externalData>
 </c:chartSpace>
+</file>
+
+<file path=ppt/handoutMasters/handoutMaster1.xml><?xml version="1.0" encoding="utf-8"?>
+<p:handoutMaster xmlns:a="http://schemas.openxmlformats.org/drawingml/2006/main" xmlns:r="http://schemas.openxmlformats.org/officeDocument/2006/relationships" xmlns:p="http://schemas.openxmlformats.org/presentationml/2006/main">
+  <p:cSld>
+    <p:bg>
+      <p:bgRef idx="1001">
+        <a:schemeClr val="bg1"/>
+      </p:bgRef>
+    </p:bg>
+    <p:spTree>
+      <p:nvGrpSpPr>
+        <p:cNvPr id="1" name=""/>
+        <p:cNvGrpSpPr/>
+        <p:nvPr/>
+      </p:nvGrpSpPr>
+      <p:grpSpPr>
+        <a:xfrm>
+          <a:off x="0" y="0"/>
+          <a:ext cx="0" cy="0"/>
+          <a:chOff x="0" y="0"/>
+          <a:chExt cx="0" cy="0"/>
+        </a:xfrm>
+      </p:grpSpPr>
+      <p:sp>
+        <p:nvSpPr>
+          <p:cNvPr id="2" name="Header Placeholder 1">
+            <a:extLst>
+              <a:ext uri="{FF2B5EF4-FFF2-40B4-BE49-F238E27FC236}">
+                <a16:creationId xmlns:a16="http://schemas.microsoft.com/office/drawing/2014/main" id="{8AE82BA3-0180-B04B-BDD0-A7BD4352E92C}"/>
+              </a:ext>
+            </a:extLst>
+          </p:cNvPr>
+          <p:cNvSpPr>
+            <a:spLocks noGrp="1"/>
+          </p:cNvSpPr>
+          <p:nvPr>
+            <p:ph type="hdr" sz="quarter"/>
+          </p:nvPr>
+        </p:nvSpPr>
+        <p:spPr>
+          <a:xfrm>
+            <a:off x="0" y="0"/>
+            <a:ext cx="4306888" cy="720725"/>
+          </a:xfrm>
+          <a:prstGeom prst="rect">
+            <a:avLst/>
+          </a:prstGeom>
+        </p:spPr>
+        <p:txBody>
+          <a:bodyPr vert="horz" lIns="91440" tIns="45720" rIns="91440" bIns="45720" rtlCol="0"/>
+          <a:lstStyle>
+            <a:lvl1pPr algn="l">
+              <a:defRPr sz="1200"/>
+            </a:lvl1pPr>
+          </a:lstStyle>
+          <a:p>
+            <a:endParaRPr lang="en-AU"/>
+          </a:p>
+        </p:txBody>
+      </p:sp>
+      <p:sp>
+        <p:nvSpPr>
+          <p:cNvPr id="3" name="Date Placeholder 2">
+            <a:extLst>
+              <a:ext uri="{FF2B5EF4-FFF2-40B4-BE49-F238E27FC236}">
+                <a16:creationId xmlns:a16="http://schemas.microsoft.com/office/drawing/2014/main" id="{8563D401-D5A9-A34E-BCCE-5DF1F93C6DC4}"/>
+              </a:ext>
+            </a:extLst>
+          </p:cNvPr>
+          <p:cNvSpPr>
+            <a:spLocks noGrp="1"/>
+          </p:cNvSpPr>
+          <p:nvPr>
+            <p:ph type="dt" sz="quarter" idx="1"/>
+          </p:nvPr>
+        </p:nvSpPr>
+        <p:spPr>
+          <a:xfrm>
+            <a:off x="5629275" y="0"/>
+            <a:ext cx="4308475" cy="720725"/>
+          </a:xfrm>
+          <a:prstGeom prst="rect">
+            <a:avLst/>
+          </a:prstGeom>
+        </p:spPr>
+        <p:txBody>
+          <a:bodyPr vert="horz" lIns="91440" tIns="45720" rIns="91440" bIns="45720" rtlCol="0"/>
+          <a:lstStyle>
+            <a:lvl1pPr algn="r">
+              <a:defRPr sz="1200"/>
+            </a:lvl1pPr>
+          </a:lstStyle>
+          <a:p>
+            <a:fld id="{8117EFE9-165F-7B4D-B823-87A95A1E979B}" type="datetimeFigureOut">
+              <a:rPr lang="en-AU" smtClean="0"/>
+              <a:t>4/8/18</a:t>
+            </a:fld>
+            <a:endParaRPr lang="en-AU"/>
+          </a:p>
+        </p:txBody>
+      </p:sp>
+      <p:sp>
+        <p:nvSpPr>
+          <p:cNvPr id="4" name="Footer Placeholder 3">
+            <a:extLst>
+              <a:ext uri="{FF2B5EF4-FFF2-40B4-BE49-F238E27FC236}">
+                <a16:creationId xmlns:a16="http://schemas.microsoft.com/office/drawing/2014/main" id="{25F46AA5-3F20-F64C-939D-DF37791B2809}"/>
+              </a:ext>
+            </a:extLst>
+          </p:cNvPr>
+          <p:cNvSpPr>
+            <a:spLocks noGrp="1"/>
+          </p:cNvSpPr>
+          <p:nvPr>
+            <p:ph type="ftr" sz="quarter" idx="2"/>
+          </p:nvPr>
+        </p:nvSpPr>
+        <p:spPr>
+          <a:xfrm>
+            <a:off x="0" y="13647738"/>
+            <a:ext cx="4306888" cy="720725"/>
+          </a:xfrm>
+          <a:prstGeom prst="rect">
+            <a:avLst/>
+          </a:prstGeom>
+        </p:spPr>
+        <p:txBody>
+          <a:bodyPr vert="horz" lIns="91440" tIns="45720" rIns="91440" bIns="45720" rtlCol="0" anchor="b"/>
+          <a:lstStyle>
+            <a:lvl1pPr algn="l">
+              <a:defRPr sz="1200"/>
+            </a:lvl1pPr>
+          </a:lstStyle>
+          <a:p>
+            <a:endParaRPr lang="en-AU"/>
+          </a:p>
+        </p:txBody>
+      </p:sp>
+      <p:sp>
+        <p:nvSpPr>
+          <p:cNvPr id="5" name="Slide Number Placeholder 4">
+            <a:extLst>
+              <a:ext uri="{FF2B5EF4-FFF2-40B4-BE49-F238E27FC236}">
+                <a16:creationId xmlns:a16="http://schemas.microsoft.com/office/drawing/2014/main" id="{D3A34DBF-5027-9540-AC4F-D49EF363B094}"/>
+              </a:ext>
+            </a:extLst>
+          </p:cNvPr>
+          <p:cNvSpPr>
+            <a:spLocks noGrp="1"/>
+          </p:cNvSpPr>
+          <p:nvPr>
+            <p:ph type="sldNum" sz="quarter" idx="3"/>
+          </p:nvPr>
+        </p:nvSpPr>
+        <p:spPr>
+          <a:xfrm>
+            <a:off x="5629275" y="13647738"/>
+            <a:ext cx="4308475" cy="720725"/>
+          </a:xfrm>
+          <a:prstGeom prst="rect">
+            <a:avLst/>
+          </a:prstGeom>
+        </p:spPr>
+        <p:txBody>
+          <a:bodyPr vert="horz" lIns="91440" tIns="45720" rIns="91440" bIns="45720" rtlCol="0" anchor="b"/>
+          <a:lstStyle>
+            <a:lvl1pPr algn="r">
+              <a:defRPr sz="1200"/>
+            </a:lvl1pPr>
+          </a:lstStyle>
+          <a:p>
+            <a:fld id="{AC474709-9AE1-394B-8617-F7D2B9A09E9D}" type="slidenum">
+              <a:rPr lang="en-AU" smtClean="0"/>
+              <a:t>‹#›</a:t>
+            </a:fld>
+            <a:endParaRPr lang="en-AU"/>
+          </a:p>
+        </p:txBody>
+      </p:sp>
+    </p:spTree>
+    <p:extLst>
+      <p:ext uri="{BB962C8B-B14F-4D97-AF65-F5344CB8AC3E}">
+        <p14:creationId xmlns:p14="http://schemas.microsoft.com/office/powerpoint/2010/main" val="1036539864"/>
+      </p:ext>
+    </p:extLst>
+  </p:cSld>
+  <p:clrMap bg1="lt1" tx1="dk1" bg2="lt2" tx2="dk2" accent1="accent1" accent2="accent2" accent3="accent3" accent4="accent4" accent5="accent5" accent6="accent6" hlink="hlink" folHlink="folHlink"/>
+</p:handoutMaster>
 </file>
 
 <file path=ppt/notesMasters/notesMaster1.xml><?xml version="1.0" encoding="utf-8"?>
@@ -9691,6 +10791,106 @@
           <a:bodyPr/>
           <a:lstStyle/>
           <a:p>
+            <a:r>
+              <a:rPr lang="en-AU" dirty="0"/>
+              <a:t>Domestic bachelor enrolments in 2016 at Table A institutions. </a:t>
+            </a:r>
+          </a:p>
+          <a:p>
+            <a:r>
+              <a:rPr lang="en-AU" dirty="0"/>
+              <a:t>Notes: Society &amp; culture is the two-digit field ’Society and Culture’ and is broader than humanities used elsewhere in this report.</a:t>
+            </a:r>
+          </a:p>
+          <a:p>
+            <a:r>
+              <a:rPr lang="en-AU" dirty="0"/>
+              <a:t>Source: DET</a:t>
+            </a:r>
+          </a:p>
+        </p:txBody>
+      </p:sp>
+      <p:sp>
+        <p:nvSpPr>
+          <p:cNvPr id="4" name="Slide Number Placeholder 3"/>
+          <p:cNvSpPr>
+            <a:spLocks noGrp="1"/>
+          </p:cNvSpPr>
+          <p:nvPr>
+            <p:ph type="sldNum" sz="quarter" idx="10"/>
+          </p:nvPr>
+        </p:nvSpPr>
+        <p:spPr/>
+        <p:txBody>
+          <a:bodyPr/>
+          <a:lstStyle/>
+          <a:p>
+            <a:fld id="{EE67FFEB-41A8-4E33-A442-87C345D03039}" type="slidenum">
+              <a:rPr lang="en-US" smtClean="0"/>
+              <a:pPr/>
+              <a:t>2</a:t>
+            </a:fld>
+            <a:endParaRPr lang="en-US"/>
+          </a:p>
+        </p:txBody>
+      </p:sp>
+    </p:spTree>
+    <p:extLst>
+      <p:ext uri="{BB962C8B-B14F-4D97-AF65-F5344CB8AC3E}">
+        <p14:creationId xmlns:p14="http://schemas.microsoft.com/office/powerpoint/2010/main" val="2010301150"/>
+      </p:ext>
+    </p:extLst>
+  </p:cSld>
+  <p:clrMapOvr>
+    <a:masterClrMapping/>
+  </p:clrMapOvr>
+</p:notes>
+</file>
+
+<file path=ppt/notesSlides/notesSlide2.xml><?xml version="1.0" encoding="utf-8"?>
+<p:notes xmlns:a="http://schemas.openxmlformats.org/drawingml/2006/main" xmlns:r="http://schemas.openxmlformats.org/officeDocument/2006/relationships" xmlns:p="http://schemas.openxmlformats.org/presentationml/2006/main">
+  <p:cSld>
+    <p:spTree>
+      <p:nvGrpSpPr>
+        <p:cNvPr id="1" name=""/>
+        <p:cNvGrpSpPr/>
+        <p:nvPr/>
+      </p:nvGrpSpPr>
+      <p:grpSpPr>
+        <a:xfrm>
+          <a:off x="0" y="0"/>
+          <a:ext cx="0" cy="0"/>
+          <a:chOff x="0" y="0"/>
+          <a:chExt cx="0" cy="0"/>
+        </a:xfrm>
+      </p:grpSpPr>
+      <p:sp>
+        <p:nvSpPr>
+          <p:cNvPr id="2" name="Slide Image Placeholder 1"/>
+          <p:cNvSpPr>
+            <a:spLocks noGrp="1" noRot="1" noChangeAspect="1"/>
+          </p:cNvSpPr>
+          <p:nvPr>
+            <p:ph type="sldImg"/>
+          </p:nvPr>
+        </p:nvSpPr>
+        <p:spPr/>
+      </p:sp>
+      <p:sp>
+        <p:nvSpPr>
+          <p:cNvPr id="3" name="Notes Placeholder 2"/>
+          <p:cNvSpPr>
+            <a:spLocks noGrp="1"/>
+          </p:cNvSpPr>
+          <p:nvPr>
+            <p:ph type="body" idx="1"/>
+          </p:nvPr>
+        </p:nvSpPr>
+        <p:spPr/>
+        <p:txBody>
+          <a:bodyPr/>
+          <a:lstStyle/>
+          <a:p>
             <a:pPr marL="0" marR="0" lvl="0" indent="0" algn="l" defTabSz="914400" rtl="0" eaLnBrk="1" fontAlgn="base" latinLnBrk="0" hangingPunct="1">
               <a:lnSpc>
                 <a:spcPct val="100000"/>
@@ -10072,7 +11272,7 @@
             <a:fld id="{EE67FFEB-41A8-4E33-A442-87C345D03039}" type="slidenum">
               <a:rPr lang="en-US" smtClean="0"/>
               <a:pPr/>
-              <a:t>4</a:t>
+              <a:t>5</a:t>
             </a:fld>
             <a:endParaRPr lang="en-US"/>
           </a:p>
@@ -10082,6 +11282,106 @@
     <p:extLst>
       <p:ext uri="{BB962C8B-B14F-4D97-AF65-F5344CB8AC3E}">
         <p14:creationId xmlns:p14="http://schemas.microsoft.com/office/powerpoint/2010/main" val="1743268119"/>
+      </p:ext>
+    </p:extLst>
+  </p:cSld>
+  <p:clrMapOvr>
+    <a:masterClrMapping/>
+  </p:clrMapOvr>
+</p:notes>
+</file>
+
+<file path=ppt/notesSlides/notesSlide3.xml><?xml version="1.0" encoding="utf-8"?>
+<p:notes xmlns:a="http://schemas.openxmlformats.org/drawingml/2006/main" xmlns:r="http://schemas.openxmlformats.org/officeDocument/2006/relationships" xmlns:p="http://schemas.openxmlformats.org/presentationml/2006/main">
+  <p:cSld>
+    <p:spTree>
+      <p:nvGrpSpPr>
+        <p:cNvPr id="1" name=""/>
+        <p:cNvGrpSpPr/>
+        <p:nvPr/>
+      </p:nvGrpSpPr>
+      <p:grpSpPr>
+        <a:xfrm>
+          <a:off x="0" y="0"/>
+          <a:ext cx="0" cy="0"/>
+          <a:chOff x="0" y="0"/>
+          <a:chExt cx="0" cy="0"/>
+        </a:xfrm>
+      </p:grpSpPr>
+      <p:sp>
+        <p:nvSpPr>
+          <p:cNvPr id="2" name="Slide Image Placeholder 1"/>
+          <p:cNvSpPr>
+            <a:spLocks noGrp="1" noRot="1" noChangeAspect="1"/>
+          </p:cNvSpPr>
+          <p:nvPr>
+            <p:ph type="sldImg"/>
+          </p:nvPr>
+        </p:nvSpPr>
+        <p:spPr/>
+      </p:sp>
+      <p:sp>
+        <p:nvSpPr>
+          <p:cNvPr id="3" name="Notes Placeholder 2"/>
+          <p:cNvSpPr>
+            <a:spLocks noGrp="1"/>
+          </p:cNvSpPr>
+          <p:nvPr>
+            <p:ph type="body" idx="1"/>
+          </p:nvPr>
+        </p:nvSpPr>
+        <p:spPr/>
+        <p:txBody>
+          <a:bodyPr/>
+          <a:lstStyle/>
+          <a:p>
+            <a:r>
+              <a:rPr lang="en-AU" dirty="0"/>
+              <a:t>Proportion of bachelor graduates by ATAR score and labour force status four months after graduation.</a:t>
+            </a:r>
+          </a:p>
+          <a:p>
+            <a:r>
+              <a:rPr lang="en-AU" dirty="0"/>
+              <a:t>Notes: Underemployed are people working part-time seeking more hours.</a:t>
+            </a:r>
+          </a:p>
+          <a:p>
+            <a:r>
+              <a:rPr lang="en-AU" dirty="0"/>
+              <a:t>Source: GOS</a:t>
+            </a:r>
+          </a:p>
+        </p:txBody>
+      </p:sp>
+      <p:sp>
+        <p:nvSpPr>
+          <p:cNvPr id="4" name="Slide Number Placeholder 3"/>
+          <p:cNvSpPr>
+            <a:spLocks noGrp="1"/>
+          </p:cNvSpPr>
+          <p:nvPr>
+            <p:ph type="sldNum" sz="quarter" idx="10"/>
+          </p:nvPr>
+        </p:nvSpPr>
+        <p:spPr/>
+        <p:txBody>
+          <a:bodyPr/>
+          <a:lstStyle/>
+          <a:p>
+            <a:fld id="{EE67FFEB-41A8-4E33-A442-87C345D03039}" type="slidenum">
+              <a:rPr lang="en-US" smtClean="0"/>
+              <a:pPr/>
+              <a:t>9</a:t>
+            </a:fld>
+            <a:endParaRPr lang="en-US"/>
+          </a:p>
+        </p:txBody>
+      </p:sp>
+    </p:spTree>
+    <p:extLst>
+      <p:ext uri="{BB962C8B-B14F-4D97-AF65-F5344CB8AC3E}">
+        <p14:creationId xmlns:p14="http://schemas.microsoft.com/office/powerpoint/2010/main" val="3451308718"/>
       </p:ext>
     </p:extLst>
   </p:cSld>
@@ -11147,6 +12447,283 @@
           <a:chExt cx="0" cy="0"/>
         </a:xfrm>
       </p:grpSpPr>
+      <p:graphicFrame>
+        <p:nvGraphicFramePr>
+          <p:cNvPr id="7" name="Chart Placeholder 6">
+            <a:extLst>
+              <a:ext uri="{FF2B5EF4-FFF2-40B4-BE49-F238E27FC236}">
+                <a16:creationId xmlns:a16="http://schemas.microsoft.com/office/drawing/2014/main" id="{85D5351F-A7D3-904D-955D-A25B8A6E7E84}"/>
+              </a:ext>
+            </a:extLst>
+          </p:cNvPr>
+          <p:cNvGraphicFramePr>
+            <a:graphicFrameLocks noGrp="1"/>
+          </p:cNvGraphicFramePr>
+          <p:nvPr>
+            <p:ph type="chart" sz="quarter" idx="10"/>
+            <p:extLst>
+              <p:ext uri="{D42A27DB-BD31-4B8C-83A1-F6EECF244321}">
+                <p14:modId xmlns:p14="http://schemas.microsoft.com/office/powerpoint/2010/main" val="4274327619"/>
+              </p:ext>
+            </p:extLst>
+          </p:nvPr>
+        </p:nvGraphicFramePr>
+        <p:xfrm>
+          <a:off x="-82550" y="-76200"/>
+          <a:ext cx="8172450" cy="5364163"/>
+        </p:xfrm>
+        <a:graphic>
+          <a:graphicData uri="http://schemas.openxmlformats.org/drawingml/2006/chart">
+            <c:chart xmlns:c="http://schemas.openxmlformats.org/drawingml/2006/chart" xmlns:r="http://schemas.openxmlformats.org/officeDocument/2006/relationships" r:id="rId3"/>
+          </a:graphicData>
+        </a:graphic>
+      </p:graphicFrame>
+      <p:sp>
+        <p:nvSpPr>
+          <p:cNvPr id="8" name="TextBox 1">
+            <a:extLst>
+              <a:ext uri="{FF2B5EF4-FFF2-40B4-BE49-F238E27FC236}">
+                <a16:creationId xmlns:a16="http://schemas.microsoft.com/office/drawing/2014/main" id="{5D1C3A94-46D8-B04F-96AA-C6DD6262C46A}"/>
+              </a:ext>
+            </a:extLst>
+          </p:cNvPr>
+          <p:cNvSpPr txBox="1"/>
+          <p:nvPr/>
+        </p:nvSpPr>
+        <p:spPr>
+          <a:xfrm>
+            <a:off x="5225002" y="351389"/>
+            <a:ext cx="936104" cy="276999"/>
+          </a:xfrm>
+          <a:prstGeom prst="rect">
+            <a:avLst/>
+          </a:prstGeom>
+          <a:noFill/>
+        </p:spPr>
+        <p:txBody>
+          <a:bodyPr wrap="square" lIns="0" tIns="0" rIns="0" bIns="0" rtlCol="0">
+            <a:spAutoFit/>
+          </a:bodyPr>
+          <a:lstStyle>
+            <a:lvl1pPr marL="0" indent="0">
+              <a:defRPr sz="1100">
+                <a:latin typeface="+mn-lt"/>
+                <a:ea typeface="+mn-ea"/>
+                <a:cs typeface="+mn-cs"/>
+              </a:defRPr>
+            </a:lvl1pPr>
+            <a:lvl2pPr marL="457200" indent="0">
+              <a:defRPr sz="1100">
+                <a:latin typeface="+mn-lt"/>
+                <a:ea typeface="+mn-ea"/>
+                <a:cs typeface="+mn-cs"/>
+              </a:defRPr>
+            </a:lvl2pPr>
+            <a:lvl3pPr marL="914400" indent="0">
+              <a:defRPr sz="1100">
+                <a:latin typeface="+mn-lt"/>
+                <a:ea typeface="+mn-ea"/>
+                <a:cs typeface="+mn-cs"/>
+              </a:defRPr>
+            </a:lvl3pPr>
+            <a:lvl4pPr marL="1371600" indent="0">
+              <a:defRPr sz="1100">
+                <a:latin typeface="+mn-lt"/>
+                <a:ea typeface="+mn-ea"/>
+                <a:cs typeface="+mn-cs"/>
+              </a:defRPr>
+            </a:lvl4pPr>
+            <a:lvl5pPr marL="1828800" indent="0">
+              <a:defRPr sz="1100">
+                <a:latin typeface="+mn-lt"/>
+                <a:ea typeface="+mn-ea"/>
+                <a:cs typeface="+mn-cs"/>
+              </a:defRPr>
+            </a:lvl5pPr>
+            <a:lvl6pPr marL="2286000" indent="0">
+              <a:defRPr sz="1100">
+                <a:latin typeface="+mn-lt"/>
+                <a:ea typeface="+mn-ea"/>
+                <a:cs typeface="+mn-cs"/>
+              </a:defRPr>
+            </a:lvl6pPr>
+            <a:lvl7pPr marL="2743200" indent="0">
+              <a:defRPr sz="1100">
+                <a:latin typeface="+mn-lt"/>
+                <a:ea typeface="+mn-ea"/>
+                <a:cs typeface="+mn-cs"/>
+              </a:defRPr>
+            </a:lvl7pPr>
+            <a:lvl8pPr marL="3200400" indent="0">
+              <a:defRPr sz="1100">
+                <a:latin typeface="+mn-lt"/>
+                <a:ea typeface="+mn-ea"/>
+                <a:cs typeface="+mn-cs"/>
+              </a:defRPr>
+            </a:lvl8pPr>
+            <a:lvl9pPr marL="3657600" indent="0">
+              <a:defRPr sz="1100">
+                <a:latin typeface="+mn-lt"/>
+                <a:ea typeface="+mn-ea"/>
+                <a:cs typeface="+mn-cs"/>
+              </a:defRPr>
+            </a:lvl9pPr>
+          </a:lstStyle>
+          <a:p>
+            <a:pPr algn="l">
+              <a:lnSpc>
+                <a:spcPct val="90000"/>
+              </a:lnSpc>
+            </a:pPr>
+            <a:r>
+              <a:rPr lang="en-AU" sz="2000" b="1" dirty="0">
+                <a:solidFill>
+                  <a:schemeClr val="accent2"/>
+                </a:solidFill>
+              </a:rPr>
+              <a:t>Female</a:t>
+            </a:r>
+          </a:p>
+        </p:txBody>
+      </p:sp>
+      <p:sp>
+        <p:nvSpPr>
+          <p:cNvPr id="9" name="TextBox 1">
+            <a:extLst>
+              <a:ext uri="{FF2B5EF4-FFF2-40B4-BE49-F238E27FC236}">
+                <a16:creationId xmlns:a16="http://schemas.microsoft.com/office/drawing/2014/main" id="{5B7A9754-B218-064E-9A36-76C0CFE7596F}"/>
+              </a:ext>
+            </a:extLst>
+          </p:cNvPr>
+          <p:cNvSpPr txBox="1"/>
+          <p:nvPr/>
+        </p:nvSpPr>
+        <p:spPr>
+          <a:xfrm>
+            <a:off x="5225002" y="614021"/>
+            <a:ext cx="936104" cy="276999"/>
+          </a:xfrm>
+          <a:prstGeom prst="rect">
+            <a:avLst/>
+          </a:prstGeom>
+          <a:noFill/>
+        </p:spPr>
+        <p:txBody>
+          <a:bodyPr wrap="square" lIns="0" tIns="0" rIns="0" bIns="0" rtlCol="0">
+            <a:spAutoFit/>
+          </a:bodyPr>
+          <a:lstStyle>
+            <a:lvl1pPr marL="0" indent="0">
+              <a:defRPr sz="1100">
+                <a:latin typeface="+mn-lt"/>
+                <a:ea typeface="+mn-ea"/>
+                <a:cs typeface="+mn-cs"/>
+              </a:defRPr>
+            </a:lvl1pPr>
+            <a:lvl2pPr marL="457200" indent="0">
+              <a:defRPr sz="1100">
+                <a:latin typeface="+mn-lt"/>
+                <a:ea typeface="+mn-ea"/>
+                <a:cs typeface="+mn-cs"/>
+              </a:defRPr>
+            </a:lvl2pPr>
+            <a:lvl3pPr marL="914400" indent="0">
+              <a:defRPr sz="1100">
+                <a:latin typeface="+mn-lt"/>
+                <a:ea typeface="+mn-ea"/>
+                <a:cs typeface="+mn-cs"/>
+              </a:defRPr>
+            </a:lvl3pPr>
+            <a:lvl4pPr marL="1371600" indent="0">
+              <a:defRPr sz="1100">
+                <a:latin typeface="+mn-lt"/>
+                <a:ea typeface="+mn-ea"/>
+                <a:cs typeface="+mn-cs"/>
+              </a:defRPr>
+            </a:lvl4pPr>
+            <a:lvl5pPr marL="1828800" indent="0">
+              <a:defRPr sz="1100">
+                <a:latin typeface="+mn-lt"/>
+                <a:ea typeface="+mn-ea"/>
+                <a:cs typeface="+mn-cs"/>
+              </a:defRPr>
+            </a:lvl5pPr>
+            <a:lvl6pPr marL="2286000" indent="0">
+              <a:defRPr sz="1100">
+                <a:latin typeface="+mn-lt"/>
+                <a:ea typeface="+mn-ea"/>
+                <a:cs typeface="+mn-cs"/>
+              </a:defRPr>
+            </a:lvl6pPr>
+            <a:lvl7pPr marL="2743200" indent="0">
+              <a:defRPr sz="1100">
+                <a:latin typeface="+mn-lt"/>
+                <a:ea typeface="+mn-ea"/>
+                <a:cs typeface="+mn-cs"/>
+              </a:defRPr>
+            </a:lvl7pPr>
+            <a:lvl8pPr marL="3200400" indent="0">
+              <a:defRPr sz="1100">
+                <a:latin typeface="+mn-lt"/>
+                <a:ea typeface="+mn-ea"/>
+                <a:cs typeface="+mn-cs"/>
+              </a:defRPr>
+            </a:lvl8pPr>
+            <a:lvl9pPr marL="3657600" indent="0">
+              <a:defRPr sz="1100">
+                <a:latin typeface="+mn-lt"/>
+                <a:ea typeface="+mn-ea"/>
+                <a:cs typeface="+mn-cs"/>
+              </a:defRPr>
+            </a:lvl9pPr>
+          </a:lstStyle>
+          <a:p>
+            <a:pPr algn="l">
+              <a:lnSpc>
+                <a:spcPct val="90000"/>
+              </a:lnSpc>
+            </a:pPr>
+            <a:r>
+              <a:rPr lang="en-AU" sz="2000" b="1" dirty="0">
+                <a:solidFill>
+                  <a:schemeClr val="tx2"/>
+                </a:solidFill>
+              </a:rPr>
+              <a:t>Male</a:t>
+            </a:r>
+          </a:p>
+        </p:txBody>
+      </p:sp>
+    </p:spTree>
+    <p:extLst>
+      <p:ext uri="{BB962C8B-B14F-4D97-AF65-F5344CB8AC3E}">
+        <p14:creationId xmlns:p14="http://schemas.microsoft.com/office/powerpoint/2010/main" val="3866401549"/>
+      </p:ext>
+    </p:extLst>
+  </p:cSld>
+  <p:clrMapOvr>
+    <a:masterClrMapping/>
+  </p:clrMapOvr>
+</p:sld>
+</file>
+
+<file path=ppt/slides/slide3.xml><?xml version="1.0" encoding="utf-8"?>
+<p:sld xmlns:a="http://schemas.openxmlformats.org/drawingml/2006/main" xmlns:r="http://schemas.openxmlformats.org/officeDocument/2006/relationships" xmlns:p="http://schemas.openxmlformats.org/presentationml/2006/main">
+  <p:cSld>
+    <p:spTree>
+      <p:nvGrpSpPr>
+        <p:cNvPr id="1" name=""/>
+        <p:cNvGrpSpPr/>
+        <p:nvPr/>
+      </p:nvGrpSpPr>
+      <p:grpSpPr>
+        <a:xfrm>
+          <a:off x="0" y="0"/>
+          <a:ext cx="0" cy="0"/>
+          <a:chOff x="0" y="0"/>
+          <a:chExt cx="0" cy="0"/>
+        </a:xfrm>
+      </p:grpSpPr>
       <p:sp>
         <p:nvSpPr>
           <p:cNvPr id="3" name="Text Placeholder 4">
@@ -12077,7 +13654,7 @@
 </p:sld>
 </file>
 
-<file path=ppt/slides/slide3.xml><?xml version="1.0" encoding="utf-8"?>
+<file path=ppt/slides/slide4.xml><?xml version="1.0" encoding="utf-8"?>
 <p:sld xmlns:a="http://schemas.openxmlformats.org/drawingml/2006/main" xmlns:r="http://schemas.openxmlformats.org/officeDocument/2006/relationships" xmlns:p="http://schemas.openxmlformats.org/presentationml/2006/main">
   <p:cSld>
     <p:spTree>
@@ -13088,7 +14665,7 @@
 </p:sld>
 </file>
 
-<file path=ppt/slides/slide4.xml><?xml version="1.0" encoding="utf-8"?>
+<file path=ppt/slides/slide5.xml><?xml version="1.0" encoding="utf-8"?>
 <p:sld xmlns:a="http://schemas.openxmlformats.org/drawingml/2006/main" xmlns:r="http://schemas.openxmlformats.org/officeDocument/2006/relationships" xmlns:p="http://schemas.openxmlformats.org/presentationml/2006/main">
   <p:cSld>
     <p:spTree>
@@ -13592,7 +15169,7 @@
 </p:sld>
 </file>
 
-<file path=ppt/slides/slide5.xml><?xml version="1.0" encoding="utf-8"?>
+<file path=ppt/slides/slide6.xml><?xml version="1.0" encoding="utf-8"?>
 <p:sld xmlns:a="http://schemas.openxmlformats.org/drawingml/2006/main" xmlns:r="http://schemas.openxmlformats.org/officeDocument/2006/relationships" xmlns:p="http://schemas.openxmlformats.org/presentationml/2006/main">
   <p:cSld>
     <p:spTree>
@@ -13825,7 +15402,7 @@
 </p:sld>
 </file>
 
-<file path=ppt/slides/slide6.xml><?xml version="1.0" encoding="utf-8"?>
+<file path=ppt/slides/slide7.xml><?xml version="1.0" encoding="utf-8"?>
 <p:sld xmlns:a="http://schemas.openxmlformats.org/drawingml/2006/main" xmlns:r="http://schemas.openxmlformats.org/officeDocument/2006/relationships" xmlns:p="http://schemas.openxmlformats.org/presentationml/2006/main">
   <p:cSld>
     <p:spTree>
@@ -14919,6 +16496,296 @@
 </p:sld>
 </file>
 
+<file path=ppt/slides/slide8.xml><?xml version="1.0" encoding="utf-8"?>
+<p:sld xmlns:a="http://schemas.openxmlformats.org/drawingml/2006/main" xmlns:r="http://schemas.openxmlformats.org/officeDocument/2006/relationships" xmlns:p="http://schemas.openxmlformats.org/presentationml/2006/main">
+  <p:cSld>
+    <p:spTree>
+      <p:nvGrpSpPr>
+        <p:cNvPr id="1" name=""/>
+        <p:cNvGrpSpPr/>
+        <p:nvPr/>
+      </p:nvGrpSpPr>
+      <p:grpSpPr>
+        <a:xfrm>
+          <a:off x="0" y="0"/>
+          <a:ext cx="0" cy="0"/>
+          <a:chOff x="0" y="0"/>
+          <a:chExt cx="0" cy="0"/>
+        </a:xfrm>
+      </p:grpSpPr>
+      <p:graphicFrame>
+        <p:nvGraphicFramePr>
+          <p:cNvPr id="7" name="Chart Placeholder 6">
+            <a:extLst>
+              <a:ext uri="{FF2B5EF4-FFF2-40B4-BE49-F238E27FC236}">
+                <a16:creationId xmlns:a16="http://schemas.microsoft.com/office/drawing/2014/main" id="{79684FC9-EC24-6F48-938B-AF4764A1DA1A}"/>
+              </a:ext>
+            </a:extLst>
+          </p:cNvPr>
+          <p:cNvGraphicFramePr>
+            <a:graphicFrameLocks noGrp="1"/>
+          </p:cNvGraphicFramePr>
+          <p:nvPr>
+            <p:ph type="chart" sz="quarter" idx="10"/>
+            <p:extLst>
+              <p:ext uri="{D42A27DB-BD31-4B8C-83A1-F6EECF244321}">
+                <p14:modId xmlns:p14="http://schemas.microsoft.com/office/powerpoint/2010/main" val="1371651401"/>
+              </p:ext>
+            </p:extLst>
+          </p:nvPr>
+        </p:nvGraphicFramePr>
+        <p:xfrm>
+          <a:off x="-82550" y="-76199"/>
+          <a:ext cx="8172450" cy="5134322"/>
+        </p:xfrm>
+        <a:graphic>
+          <a:graphicData uri="http://schemas.openxmlformats.org/drawingml/2006/chart">
+            <c:chart xmlns:c="http://schemas.openxmlformats.org/drawingml/2006/chart" xmlns:r="http://schemas.openxmlformats.org/officeDocument/2006/relationships" r:id="rId2"/>
+          </a:graphicData>
+        </a:graphic>
+      </p:graphicFrame>
+      <p:sp>
+        <p:nvSpPr>
+          <p:cNvPr id="8" name="TextBox 7">
+            <a:extLst>
+              <a:ext uri="{FF2B5EF4-FFF2-40B4-BE49-F238E27FC236}">
+                <a16:creationId xmlns:a16="http://schemas.microsoft.com/office/drawing/2014/main" id="{1C0F544A-93F7-444C-9AEF-1937FCEFC4DA}"/>
+              </a:ext>
+            </a:extLst>
+          </p:cNvPr>
+          <p:cNvSpPr txBox="1"/>
+          <p:nvPr/>
+        </p:nvSpPr>
+        <p:spPr>
+          <a:xfrm>
+            <a:off x="2260402" y="4970401"/>
+            <a:ext cx="3960440" cy="249299"/>
+          </a:xfrm>
+          <a:prstGeom prst="rect">
+            <a:avLst/>
+          </a:prstGeom>
+          <a:noFill/>
+        </p:spPr>
+        <p:txBody>
+          <a:bodyPr wrap="square" lIns="0" tIns="0" rIns="0" bIns="0" rtlCol="0">
+            <a:spAutoFit/>
+          </a:bodyPr>
+          <a:lstStyle/>
+          <a:p>
+            <a:pPr algn="ctr">
+              <a:lnSpc>
+                <a:spcPct val="90000"/>
+              </a:lnSpc>
+            </a:pPr>
+            <a:r>
+              <a:rPr lang="en-AU" sz="1800" b="1" dirty="0"/>
+              <a:t>ATAR</a:t>
+            </a:r>
+          </a:p>
+        </p:txBody>
+      </p:sp>
+    </p:spTree>
+    <p:extLst>
+      <p:ext uri="{BB962C8B-B14F-4D97-AF65-F5344CB8AC3E}">
+        <p14:creationId xmlns:p14="http://schemas.microsoft.com/office/powerpoint/2010/main" val="4280045323"/>
+      </p:ext>
+    </p:extLst>
+  </p:cSld>
+  <p:clrMapOvr>
+    <a:masterClrMapping/>
+  </p:clrMapOvr>
+</p:sld>
+</file>
+
+<file path=ppt/slides/slide9.xml><?xml version="1.0" encoding="utf-8"?>
+<p:sld xmlns:a="http://schemas.openxmlformats.org/drawingml/2006/main" xmlns:r="http://schemas.openxmlformats.org/officeDocument/2006/relationships" xmlns:p="http://schemas.openxmlformats.org/presentationml/2006/main">
+  <p:cSld>
+    <p:spTree>
+      <p:nvGrpSpPr>
+        <p:cNvPr id="1" name=""/>
+        <p:cNvGrpSpPr/>
+        <p:nvPr/>
+      </p:nvGrpSpPr>
+      <p:grpSpPr>
+        <a:xfrm>
+          <a:off x="0" y="0"/>
+          <a:ext cx="0" cy="0"/>
+          <a:chOff x="0" y="0"/>
+          <a:chExt cx="0" cy="0"/>
+        </a:xfrm>
+      </p:grpSpPr>
+      <p:graphicFrame>
+        <p:nvGraphicFramePr>
+          <p:cNvPr id="7" name="Chart Placeholder 6">
+            <a:extLst>
+              <a:ext uri="{FF2B5EF4-FFF2-40B4-BE49-F238E27FC236}">
+                <a16:creationId xmlns:a16="http://schemas.microsoft.com/office/drawing/2014/main" id="{79684FC9-EC24-6F48-938B-AF4764A1DA1A}"/>
+              </a:ext>
+            </a:extLst>
+          </p:cNvPr>
+          <p:cNvGraphicFramePr>
+            <a:graphicFrameLocks noGrp="1"/>
+          </p:cNvGraphicFramePr>
+          <p:nvPr>
+            <p:ph type="chart" sz="quarter" idx="10"/>
+            <p:extLst>
+              <p:ext uri="{D42A27DB-BD31-4B8C-83A1-F6EECF244321}">
+                <p14:modId xmlns:p14="http://schemas.microsoft.com/office/powerpoint/2010/main" val="2581428082"/>
+              </p:ext>
+            </p:extLst>
+          </p:nvPr>
+        </p:nvGraphicFramePr>
+        <p:xfrm>
+          <a:off x="-82550" y="-76199"/>
+          <a:ext cx="8172450" cy="5134322"/>
+        </p:xfrm>
+        <a:graphic>
+          <a:graphicData uri="http://schemas.openxmlformats.org/drawingml/2006/chart">
+            <c:chart xmlns:c="http://schemas.openxmlformats.org/drawingml/2006/chart" xmlns:r="http://schemas.openxmlformats.org/officeDocument/2006/relationships" r:id="rId3"/>
+          </a:graphicData>
+        </a:graphic>
+      </p:graphicFrame>
+      <p:sp>
+        <p:nvSpPr>
+          <p:cNvPr id="8" name="TextBox 7">
+            <a:extLst>
+              <a:ext uri="{FF2B5EF4-FFF2-40B4-BE49-F238E27FC236}">
+                <a16:creationId xmlns:a16="http://schemas.microsoft.com/office/drawing/2014/main" id="{1C0F544A-93F7-444C-9AEF-1937FCEFC4DA}"/>
+              </a:ext>
+            </a:extLst>
+          </p:cNvPr>
+          <p:cNvSpPr txBox="1"/>
+          <p:nvPr/>
+        </p:nvSpPr>
+        <p:spPr>
+          <a:xfrm>
+            <a:off x="2260402" y="4970401"/>
+            <a:ext cx="3960440" cy="249299"/>
+          </a:xfrm>
+          <a:prstGeom prst="rect">
+            <a:avLst/>
+          </a:prstGeom>
+          <a:noFill/>
+        </p:spPr>
+        <p:txBody>
+          <a:bodyPr wrap="square" lIns="0" tIns="0" rIns="0" bIns="0" rtlCol="0">
+            <a:spAutoFit/>
+          </a:bodyPr>
+          <a:lstStyle/>
+          <a:p>
+            <a:pPr algn="ctr">
+              <a:lnSpc>
+                <a:spcPct val="90000"/>
+              </a:lnSpc>
+            </a:pPr>
+            <a:r>
+              <a:rPr lang="en-AU" sz="1800" b="1" dirty="0"/>
+              <a:t>ATAR</a:t>
+            </a:r>
+          </a:p>
+        </p:txBody>
+      </p:sp>
+      <p:sp>
+        <p:nvSpPr>
+          <p:cNvPr id="2" name="TextBox 1">
+            <a:extLst>
+              <a:ext uri="{FF2B5EF4-FFF2-40B4-BE49-F238E27FC236}">
+                <a16:creationId xmlns:a16="http://schemas.microsoft.com/office/drawing/2014/main" id="{B7A6A5EE-8D62-D741-BEF7-48424608DF75}"/>
+              </a:ext>
+            </a:extLst>
+          </p:cNvPr>
+          <p:cNvSpPr txBox="1"/>
+          <p:nvPr/>
+        </p:nvSpPr>
+        <p:spPr>
+          <a:xfrm>
+            <a:off x="1540322" y="141382"/>
+            <a:ext cx="2232248" cy="249299"/>
+          </a:xfrm>
+          <a:prstGeom prst="rect">
+            <a:avLst/>
+          </a:prstGeom>
+          <a:noFill/>
+        </p:spPr>
+        <p:txBody>
+          <a:bodyPr wrap="square" lIns="0" tIns="0" rIns="0" bIns="0" rtlCol="0">
+            <a:spAutoFit/>
+          </a:bodyPr>
+          <a:lstStyle/>
+          <a:p>
+            <a:pPr algn="l">
+              <a:lnSpc>
+                <a:spcPct val="90000"/>
+              </a:lnSpc>
+            </a:pPr>
+            <a:r>
+              <a:rPr lang="en-AU" sz="1800" b="1" dirty="0">
+                <a:solidFill>
+                  <a:schemeClr val="accent1"/>
+                </a:solidFill>
+              </a:rPr>
+              <a:t>Underemployed</a:t>
+            </a:r>
+          </a:p>
+        </p:txBody>
+      </p:sp>
+      <p:sp>
+        <p:nvSpPr>
+          <p:cNvPr id="5" name="TextBox 4">
+            <a:extLst>
+              <a:ext uri="{FF2B5EF4-FFF2-40B4-BE49-F238E27FC236}">
+                <a16:creationId xmlns:a16="http://schemas.microsoft.com/office/drawing/2014/main" id="{CD84E32A-8DFB-FE45-BB7B-153FD8B82030}"/>
+              </a:ext>
+            </a:extLst>
+          </p:cNvPr>
+          <p:cNvSpPr txBox="1"/>
+          <p:nvPr/>
+        </p:nvSpPr>
+        <p:spPr>
+          <a:xfrm>
+            <a:off x="1540322" y="390681"/>
+            <a:ext cx="2232248" cy="249299"/>
+          </a:xfrm>
+          <a:prstGeom prst="rect">
+            <a:avLst/>
+          </a:prstGeom>
+          <a:noFill/>
+        </p:spPr>
+        <p:txBody>
+          <a:bodyPr wrap="square" lIns="0" tIns="0" rIns="0" bIns="0" rtlCol="0">
+            <a:spAutoFit/>
+          </a:bodyPr>
+          <a:lstStyle/>
+          <a:p>
+            <a:pPr algn="l">
+              <a:lnSpc>
+                <a:spcPct val="90000"/>
+              </a:lnSpc>
+            </a:pPr>
+            <a:r>
+              <a:rPr lang="en-AU" sz="1800" b="1" dirty="0">
+                <a:solidFill>
+                  <a:schemeClr val="tx2"/>
+                </a:solidFill>
+              </a:rPr>
+              <a:t>Unemployed</a:t>
+            </a:r>
+          </a:p>
+        </p:txBody>
+      </p:sp>
+    </p:spTree>
+    <p:extLst>
+      <p:ext uri="{BB962C8B-B14F-4D97-AF65-F5344CB8AC3E}">
+        <p14:creationId xmlns:p14="http://schemas.microsoft.com/office/powerpoint/2010/main" val="2686945636"/>
+      </p:ext>
+    </p:extLst>
+  </p:cSld>
+  <p:clrMapOvr>
+    <a:masterClrMapping/>
+  </p:clrMapOvr>
+</p:sld>
+</file>
+
 <file path=ppt/theme/theme1.xml><?xml version="1.0" encoding="utf-8"?>
 <a:theme xmlns:a="http://schemas.openxmlformats.org/drawingml/2006/main" name="NEW IMPROVED Charts for REPORTS 16 MAY 2016">
   <a:themeElements>
@@ -15617,7 +17484,744 @@
 </a:theme>
 </file>
 
+<file path=ppt/theme/theme3.xml><?xml version="1.0" encoding="utf-8"?>
+<a:theme xmlns:a="http://schemas.openxmlformats.org/drawingml/2006/main" name="Office Theme">
+  <a:themeElements>
+    <a:clrScheme name="Office">
+      <a:dk1>
+        <a:sysClr val="windowText" lastClr="000000"/>
+      </a:dk1>
+      <a:lt1>
+        <a:sysClr val="window" lastClr="FFFFFF"/>
+      </a:lt1>
+      <a:dk2>
+        <a:srgbClr val="44546A"/>
+      </a:dk2>
+      <a:lt2>
+        <a:srgbClr val="E7E6E6"/>
+      </a:lt2>
+      <a:accent1>
+        <a:srgbClr val="4472C4"/>
+      </a:accent1>
+      <a:accent2>
+        <a:srgbClr val="ED7D31"/>
+      </a:accent2>
+      <a:accent3>
+        <a:srgbClr val="A5A5A5"/>
+      </a:accent3>
+      <a:accent4>
+        <a:srgbClr val="FFC000"/>
+      </a:accent4>
+      <a:accent5>
+        <a:srgbClr val="5B9BD5"/>
+      </a:accent5>
+      <a:accent6>
+        <a:srgbClr val="70AD47"/>
+      </a:accent6>
+      <a:hlink>
+        <a:srgbClr val="0563C1"/>
+      </a:hlink>
+      <a:folHlink>
+        <a:srgbClr val="954F72"/>
+      </a:folHlink>
+    </a:clrScheme>
+    <a:fontScheme name="Office">
+      <a:majorFont>
+        <a:latin typeface="Calibri Light" panose="020F0302020204030204"/>
+        <a:ea typeface=""/>
+        <a:cs typeface=""/>
+        <a:font script="Jpan" typeface="游ゴシック Light"/>
+        <a:font script="Hang" typeface="맑은 고딕"/>
+        <a:font script="Hans" typeface="等线 Light"/>
+        <a:font script="Hant" typeface="新細明體"/>
+        <a:font script="Arab" typeface="Times New Roman"/>
+        <a:font script="Hebr" typeface="Times New Roman"/>
+        <a:font script="Thai" typeface="Angsana New"/>
+        <a:font script="Ethi" typeface="Nyala"/>
+        <a:font script="Beng" typeface="Vrinda"/>
+        <a:font script="Gujr" typeface="Shruti"/>
+        <a:font script="Khmr" typeface="MoolBoran"/>
+        <a:font script="Knda" typeface="Tunga"/>
+        <a:font script="Guru" typeface="Raavi"/>
+        <a:font script="Cans" typeface="Euphemia"/>
+        <a:font script="Cher" typeface="Plantagenet Cherokee"/>
+        <a:font script="Yiii" typeface="Microsoft Yi Baiti"/>
+        <a:font script="Tibt" typeface="Microsoft Himalaya"/>
+        <a:font script="Thaa" typeface="MV Boli"/>
+        <a:font script="Deva" typeface="Mangal"/>
+        <a:font script="Telu" typeface="Gautami"/>
+        <a:font script="Taml" typeface="Latha"/>
+        <a:font script="Syrc" typeface="Estrangelo Edessa"/>
+        <a:font script="Orya" typeface="Kalinga"/>
+        <a:font script="Mlym" typeface="Kartika"/>
+        <a:font script="Laoo" typeface="DokChampa"/>
+        <a:font script="Sinh" typeface="Iskoola Pota"/>
+        <a:font script="Mong" typeface="Mongolian Baiti"/>
+        <a:font script="Viet" typeface="Times New Roman"/>
+        <a:font script="Uigh" typeface="Microsoft Uighur"/>
+        <a:font script="Geor" typeface="Sylfaen"/>
+        <a:font script="Armn" typeface="Arial"/>
+        <a:font script="Bugi" typeface="Leelawadee UI"/>
+        <a:font script="Bopo" typeface="Microsoft JhengHei"/>
+        <a:font script="Java" typeface="Javanese Text"/>
+        <a:font script="Lisu" typeface="Segoe UI"/>
+        <a:font script="Mymr" typeface="Myanmar Text"/>
+        <a:font script="Nkoo" typeface="Ebrima"/>
+        <a:font script="Olck" typeface="Nirmala UI"/>
+        <a:font script="Osma" typeface="Ebrima"/>
+        <a:font script="Phag" typeface="Phagspa"/>
+        <a:font script="Syrn" typeface="Estrangelo Edessa"/>
+        <a:font script="Syrj" typeface="Estrangelo Edessa"/>
+        <a:font script="Syre" typeface="Estrangelo Edessa"/>
+        <a:font script="Sora" typeface="Nirmala UI"/>
+        <a:font script="Tale" typeface="Microsoft Tai Le"/>
+        <a:font script="Talu" typeface="Microsoft New Tai Lue"/>
+        <a:font script="Tfng" typeface="Ebrima"/>
+      </a:majorFont>
+      <a:minorFont>
+        <a:latin typeface="Calibri" panose="020F0502020204030204"/>
+        <a:ea typeface=""/>
+        <a:cs typeface=""/>
+        <a:font script="Jpan" typeface="游ゴシック"/>
+        <a:font script="Hang" typeface="맑은 고딕"/>
+        <a:font script="Hans" typeface="等线"/>
+        <a:font script="Hant" typeface="新細明體"/>
+        <a:font script="Arab" typeface="Arial"/>
+        <a:font script="Hebr" typeface="Arial"/>
+        <a:font script="Thai" typeface="Cordia New"/>
+        <a:font script="Ethi" typeface="Nyala"/>
+        <a:font script="Beng" typeface="Vrinda"/>
+        <a:font script="Gujr" typeface="Shruti"/>
+        <a:font script="Khmr" typeface="DaunPenh"/>
+        <a:font script="Knda" typeface="Tunga"/>
+        <a:font script="Guru" typeface="Raavi"/>
+        <a:font script="Cans" typeface="Euphemia"/>
+        <a:font script="Cher" typeface="Plantagenet Cherokee"/>
+        <a:font script="Yiii" typeface="Microsoft Yi Baiti"/>
+        <a:font script="Tibt" typeface="Microsoft Himalaya"/>
+        <a:font script="Thaa" typeface="MV Boli"/>
+        <a:font script="Deva" typeface="Mangal"/>
+        <a:font script="Telu" typeface="Gautami"/>
+        <a:font script="Taml" typeface="Latha"/>
+        <a:font script="Syrc" typeface="Estrangelo Edessa"/>
+        <a:font script="Orya" typeface="Kalinga"/>
+        <a:font script="Mlym" typeface="Kartika"/>
+        <a:font script="Laoo" typeface="DokChampa"/>
+        <a:font script="Sinh" typeface="Iskoola Pota"/>
+        <a:font script="Mong" typeface="Mongolian Baiti"/>
+        <a:font script="Viet" typeface="Arial"/>
+        <a:font script="Uigh" typeface="Microsoft Uighur"/>
+        <a:font script="Geor" typeface="Sylfaen"/>
+        <a:font script="Armn" typeface="Arial"/>
+        <a:font script="Bugi" typeface="Leelawadee UI"/>
+        <a:font script="Bopo" typeface="Microsoft JhengHei"/>
+        <a:font script="Java" typeface="Javanese Text"/>
+        <a:font script="Lisu" typeface="Segoe UI"/>
+        <a:font script="Mymr" typeface="Myanmar Text"/>
+        <a:font script="Nkoo" typeface="Ebrima"/>
+        <a:font script="Olck" typeface="Nirmala UI"/>
+        <a:font script="Osma" typeface="Ebrima"/>
+        <a:font script="Phag" typeface="Phagspa"/>
+        <a:font script="Syrn" typeface="Estrangelo Edessa"/>
+        <a:font script="Syrj" typeface="Estrangelo Edessa"/>
+        <a:font script="Syre" typeface="Estrangelo Edessa"/>
+        <a:font script="Sora" typeface="Nirmala UI"/>
+        <a:font script="Tale" typeface="Microsoft Tai Le"/>
+        <a:font script="Talu" typeface="Microsoft New Tai Lue"/>
+        <a:font script="Tfng" typeface="Ebrima"/>
+      </a:minorFont>
+    </a:fontScheme>
+    <a:fmtScheme name="Office">
+      <a:fillStyleLst>
+        <a:solidFill>
+          <a:schemeClr val="phClr"/>
+        </a:solidFill>
+        <a:gradFill rotWithShape="1">
+          <a:gsLst>
+            <a:gs pos="0">
+              <a:schemeClr val="phClr">
+                <a:lumMod val="110000"/>
+                <a:satMod val="105000"/>
+                <a:tint val="67000"/>
+              </a:schemeClr>
+            </a:gs>
+            <a:gs pos="50000">
+              <a:schemeClr val="phClr">
+                <a:lumMod val="105000"/>
+                <a:satMod val="103000"/>
+                <a:tint val="73000"/>
+              </a:schemeClr>
+            </a:gs>
+            <a:gs pos="100000">
+              <a:schemeClr val="phClr">
+                <a:lumMod val="105000"/>
+                <a:satMod val="109000"/>
+                <a:tint val="81000"/>
+              </a:schemeClr>
+            </a:gs>
+          </a:gsLst>
+          <a:lin ang="5400000" scaled="0"/>
+        </a:gradFill>
+        <a:gradFill rotWithShape="1">
+          <a:gsLst>
+            <a:gs pos="0">
+              <a:schemeClr val="phClr">
+                <a:satMod val="103000"/>
+                <a:lumMod val="102000"/>
+                <a:tint val="94000"/>
+              </a:schemeClr>
+            </a:gs>
+            <a:gs pos="50000">
+              <a:schemeClr val="phClr">
+                <a:satMod val="110000"/>
+                <a:lumMod val="100000"/>
+                <a:shade val="100000"/>
+              </a:schemeClr>
+            </a:gs>
+            <a:gs pos="100000">
+              <a:schemeClr val="phClr">
+                <a:lumMod val="99000"/>
+                <a:satMod val="120000"/>
+                <a:shade val="78000"/>
+              </a:schemeClr>
+            </a:gs>
+          </a:gsLst>
+          <a:lin ang="5400000" scaled="0"/>
+        </a:gradFill>
+      </a:fillStyleLst>
+      <a:lnStyleLst>
+        <a:ln w="6350" cap="flat" cmpd="sng" algn="ctr">
+          <a:solidFill>
+            <a:schemeClr val="phClr"/>
+          </a:solidFill>
+          <a:prstDash val="solid"/>
+          <a:miter lim="800000"/>
+        </a:ln>
+        <a:ln w="12700" cap="flat" cmpd="sng" algn="ctr">
+          <a:solidFill>
+            <a:schemeClr val="phClr"/>
+          </a:solidFill>
+          <a:prstDash val="solid"/>
+          <a:miter lim="800000"/>
+        </a:ln>
+        <a:ln w="19050" cap="flat" cmpd="sng" algn="ctr">
+          <a:solidFill>
+            <a:schemeClr val="phClr"/>
+          </a:solidFill>
+          <a:prstDash val="solid"/>
+          <a:miter lim="800000"/>
+        </a:ln>
+      </a:lnStyleLst>
+      <a:effectStyleLst>
+        <a:effectStyle>
+          <a:effectLst/>
+        </a:effectStyle>
+        <a:effectStyle>
+          <a:effectLst/>
+        </a:effectStyle>
+        <a:effectStyle>
+          <a:effectLst>
+            <a:outerShdw blurRad="57150" dist="19050" dir="5400000" algn="ctr" rotWithShape="0">
+              <a:srgbClr val="000000">
+                <a:alpha val="63000"/>
+              </a:srgbClr>
+            </a:outerShdw>
+          </a:effectLst>
+        </a:effectStyle>
+      </a:effectStyleLst>
+      <a:bgFillStyleLst>
+        <a:solidFill>
+          <a:schemeClr val="phClr"/>
+        </a:solidFill>
+        <a:solidFill>
+          <a:schemeClr val="phClr">
+            <a:tint val="95000"/>
+            <a:satMod val="170000"/>
+          </a:schemeClr>
+        </a:solidFill>
+        <a:gradFill rotWithShape="1">
+          <a:gsLst>
+            <a:gs pos="0">
+              <a:schemeClr val="phClr">
+                <a:tint val="93000"/>
+                <a:satMod val="150000"/>
+                <a:shade val="98000"/>
+                <a:lumMod val="102000"/>
+              </a:schemeClr>
+            </a:gs>
+            <a:gs pos="50000">
+              <a:schemeClr val="phClr">
+                <a:tint val="98000"/>
+                <a:satMod val="130000"/>
+                <a:shade val="90000"/>
+                <a:lumMod val="103000"/>
+              </a:schemeClr>
+            </a:gs>
+            <a:gs pos="100000">
+              <a:schemeClr val="phClr">
+                <a:shade val="63000"/>
+                <a:satMod val="120000"/>
+              </a:schemeClr>
+            </a:gs>
+          </a:gsLst>
+          <a:lin ang="5400000" scaled="0"/>
+        </a:gradFill>
+      </a:bgFillStyleLst>
+    </a:fmtScheme>
+  </a:themeElements>
+  <a:objectDefaults/>
+  <a:extraClrSchemeLst/>
+  <a:extLst>
+    <a:ext uri="{05A4C25C-085E-4340-85A3-A5531E510DB2}">
+      <thm15:themeFamily xmlns:thm15="http://schemas.microsoft.com/office/thememl/2012/main" name="Office Theme" id="{62F939B6-93AF-4DB8-9C6B-D6C7DFDC589F}" vid="{4A3C46E8-61CC-4603-A589-7422A47A8E4A}"/>
+    </a:ext>
+  </a:extLst>
+</a:theme>
+</file>
+
 <file path=ppt/theme/themeOverride1.xml><?xml version="1.0" encoding="utf-8"?>
+<a:themeOverride xmlns:a="http://schemas.openxmlformats.org/drawingml/2006/main">
+  <a:clrScheme name="Grattan">
+    <a:dk1>
+      <a:srgbClr val="000000"/>
+    </a:dk1>
+    <a:lt1>
+      <a:srgbClr val="FFFFFF"/>
+    </a:lt1>
+    <a:dk2>
+      <a:srgbClr val="A02226"/>
+    </a:dk2>
+    <a:lt2>
+      <a:srgbClr val="621214"/>
+    </a:lt2>
+    <a:accent1>
+      <a:srgbClr val="D4582A"/>
+    </a:accent1>
+    <a:accent2>
+      <a:srgbClr val="F68B33"/>
+    </a:accent2>
+    <a:accent3>
+      <a:srgbClr val="FFC35A"/>
+    </a:accent3>
+    <a:accent4>
+      <a:srgbClr val="FFE07F"/>
+    </a:accent4>
+    <a:accent5>
+      <a:srgbClr val="F3901D"/>
+    </a:accent5>
+    <a:accent6>
+      <a:srgbClr val="6A737B"/>
+    </a:accent6>
+    <a:hlink>
+      <a:srgbClr val="757575"/>
+    </a:hlink>
+    <a:folHlink>
+      <a:srgbClr val="AEAEAE"/>
+    </a:folHlink>
+  </a:clrScheme>
+  <a:fontScheme name="Blank Presentation">
+    <a:majorFont>
+      <a:latin typeface="Arial"/>
+      <a:ea typeface="ＭＳ Ｐゴシック"/>
+      <a:cs typeface=""/>
+    </a:majorFont>
+    <a:minorFont>
+      <a:latin typeface="Arial"/>
+      <a:ea typeface="ＭＳ Ｐゴシック"/>
+      <a:cs typeface=""/>
+    </a:minorFont>
+  </a:fontScheme>
+  <a:fmtScheme name="Office">
+    <a:fillStyleLst>
+      <a:solidFill>
+        <a:schemeClr val="phClr"/>
+      </a:solidFill>
+      <a:gradFill rotWithShape="1">
+        <a:gsLst>
+          <a:gs pos="0">
+            <a:schemeClr val="phClr">
+              <a:tint val="50000"/>
+              <a:satMod val="300000"/>
+            </a:schemeClr>
+          </a:gs>
+          <a:gs pos="35000">
+            <a:schemeClr val="phClr">
+              <a:tint val="37000"/>
+              <a:satMod val="300000"/>
+            </a:schemeClr>
+          </a:gs>
+          <a:gs pos="100000">
+            <a:schemeClr val="phClr">
+              <a:tint val="15000"/>
+              <a:satMod val="350000"/>
+            </a:schemeClr>
+          </a:gs>
+        </a:gsLst>
+        <a:lin ang="16200000" scaled="1"/>
+      </a:gradFill>
+      <a:gradFill rotWithShape="1">
+        <a:gsLst>
+          <a:gs pos="0">
+            <a:schemeClr val="phClr">
+              <a:shade val="51000"/>
+              <a:satMod val="130000"/>
+            </a:schemeClr>
+          </a:gs>
+          <a:gs pos="80000">
+            <a:schemeClr val="phClr">
+              <a:shade val="93000"/>
+              <a:satMod val="130000"/>
+            </a:schemeClr>
+          </a:gs>
+          <a:gs pos="100000">
+            <a:schemeClr val="phClr">
+              <a:shade val="94000"/>
+              <a:satMod val="135000"/>
+            </a:schemeClr>
+          </a:gs>
+        </a:gsLst>
+        <a:lin ang="16200000" scaled="0"/>
+      </a:gradFill>
+    </a:fillStyleLst>
+    <a:lnStyleLst>
+      <a:ln w="9525" cap="flat" cmpd="sng" algn="ctr">
+        <a:solidFill>
+          <a:schemeClr val="phClr">
+            <a:shade val="95000"/>
+            <a:satMod val="105000"/>
+          </a:schemeClr>
+        </a:solidFill>
+        <a:prstDash val="solid"/>
+      </a:ln>
+      <a:ln w="25400" cap="flat" cmpd="sng" algn="ctr">
+        <a:solidFill>
+          <a:schemeClr val="phClr"/>
+        </a:solidFill>
+        <a:prstDash val="solid"/>
+      </a:ln>
+      <a:ln w="38100" cap="flat" cmpd="sng" algn="ctr">
+        <a:solidFill>
+          <a:schemeClr val="phClr"/>
+        </a:solidFill>
+        <a:prstDash val="solid"/>
+      </a:ln>
+    </a:lnStyleLst>
+    <a:effectStyleLst>
+      <a:effectStyle>
+        <a:effectLst>
+          <a:outerShdw blurRad="40000" dist="20000" dir="5400000" rotWithShape="0">
+            <a:srgbClr val="000000">
+              <a:alpha val="38000"/>
+            </a:srgbClr>
+          </a:outerShdw>
+        </a:effectLst>
+      </a:effectStyle>
+      <a:effectStyle>
+        <a:effectLst>
+          <a:outerShdw blurRad="40000" dist="23000" dir="5400000" rotWithShape="0">
+            <a:srgbClr val="000000">
+              <a:alpha val="35000"/>
+            </a:srgbClr>
+          </a:outerShdw>
+        </a:effectLst>
+      </a:effectStyle>
+      <a:effectStyle>
+        <a:effectLst>
+          <a:outerShdw blurRad="40000" dist="23000" dir="5400000" rotWithShape="0">
+            <a:srgbClr val="000000">
+              <a:alpha val="35000"/>
+            </a:srgbClr>
+          </a:outerShdw>
+        </a:effectLst>
+        <a:scene3d>
+          <a:camera prst="orthographicFront">
+            <a:rot lat="0" lon="0" rev="0"/>
+          </a:camera>
+          <a:lightRig rig="threePt" dir="t">
+            <a:rot lat="0" lon="0" rev="1200000"/>
+          </a:lightRig>
+        </a:scene3d>
+        <a:sp3d>
+          <a:bevelT w="63500" h="25400"/>
+        </a:sp3d>
+      </a:effectStyle>
+    </a:effectStyleLst>
+    <a:bgFillStyleLst>
+      <a:solidFill>
+        <a:schemeClr val="phClr"/>
+      </a:solidFill>
+      <a:gradFill rotWithShape="1">
+        <a:gsLst>
+          <a:gs pos="0">
+            <a:schemeClr val="phClr">
+              <a:tint val="40000"/>
+              <a:satMod val="350000"/>
+            </a:schemeClr>
+          </a:gs>
+          <a:gs pos="40000">
+            <a:schemeClr val="phClr">
+              <a:tint val="45000"/>
+              <a:shade val="99000"/>
+              <a:satMod val="350000"/>
+            </a:schemeClr>
+          </a:gs>
+          <a:gs pos="100000">
+            <a:schemeClr val="phClr">
+              <a:shade val="20000"/>
+              <a:satMod val="255000"/>
+            </a:schemeClr>
+          </a:gs>
+        </a:gsLst>
+        <a:path path="circle">
+          <a:fillToRect l="50000" t="-80000" r="50000" b="180000"/>
+        </a:path>
+      </a:gradFill>
+      <a:gradFill rotWithShape="1">
+        <a:gsLst>
+          <a:gs pos="0">
+            <a:schemeClr val="phClr">
+              <a:tint val="80000"/>
+              <a:satMod val="300000"/>
+            </a:schemeClr>
+          </a:gs>
+          <a:gs pos="100000">
+            <a:schemeClr val="phClr">
+              <a:shade val="30000"/>
+              <a:satMod val="200000"/>
+            </a:schemeClr>
+          </a:gs>
+        </a:gsLst>
+        <a:path path="circle">
+          <a:fillToRect l="50000" t="50000" r="50000" b="50000"/>
+        </a:path>
+      </a:gradFill>
+    </a:bgFillStyleLst>
+  </a:fmtScheme>
+</a:themeOverride>
+</file>
+
+<file path=ppt/theme/themeOverride10.xml><?xml version="1.0" encoding="utf-8"?>
+<a:themeOverride xmlns:a="http://schemas.openxmlformats.org/drawingml/2006/main">
+  <a:clrScheme name="Grattan">
+    <a:dk1>
+      <a:srgbClr val="000000"/>
+    </a:dk1>
+    <a:lt1>
+      <a:srgbClr val="FFFFFF"/>
+    </a:lt1>
+    <a:dk2>
+      <a:srgbClr val="A02226"/>
+    </a:dk2>
+    <a:lt2>
+      <a:srgbClr val="621214"/>
+    </a:lt2>
+    <a:accent1>
+      <a:srgbClr val="D4582A"/>
+    </a:accent1>
+    <a:accent2>
+      <a:srgbClr val="F68B33"/>
+    </a:accent2>
+    <a:accent3>
+      <a:srgbClr val="FFC35A"/>
+    </a:accent3>
+    <a:accent4>
+      <a:srgbClr val="FFE07F"/>
+    </a:accent4>
+    <a:accent5>
+      <a:srgbClr val="F3901D"/>
+    </a:accent5>
+    <a:accent6>
+      <a:srgbClr val="6A737B"/>
+    </a:accent6>
+    <a:hlink>
+      <a:srgbClr val="757575"/>
+    </a:hlink>
+    <a:folHlink>
+      <a:srgbClr val="AEAEAE"/>
+    </a:folHlink>
+  </a:clrScheme>
+  <a:fontScheme name="Blank Presentation">
+    <a:majorFont>
+      <a:latin typeface="Arial"/>
+      <a:ea typeface="ＭＳ Ｐゴシック"/>
+      <a:cs typeface=""/>
+    </a:majorFont>
+    <a:minorFont>
+      <a:latin typeface="Arial"/>
+      <a:ea typeface="ＭＳ Ｐゴシック"/>
+      <a:cs typeface=""/>
+    </a:minorFont>
+  </a:fontScheme>
+  <a:fmtScheme name="Office">
+    <a:fillStyleLst>
+      <a:solidFill>
+        <a:schemeClr val="phClr"/>
+      </a:solidFill>
+      <a:gradFill rotWithShape="1">
+        <a:gsLst>
+          <a:gs pos="0">
+            <a:schemeClr val="phClr">
+              <a:tint val="50000"/>
+              <a:satMod val="300000"/>
+            </a:schemeClr>
+          </a:gs>
+          <a:gs pos="35000">
+            <a:schemeClr val="phClr">
+              <a:tint val="37000"/>
+              <a:satMod val="300000"/>
+            </a:schemeClr>
+          </a:gs>
+          <a:gs pos="100000">
+            <a:schemeClr val="phClr">
+              <a:tint val="15000"/>
+              <a:satMod val="350000"/>
+            </a:schemeClr>
+          </a:gs>
+        </a:gsLst>
+        <a:lin ang="16200000" scaled="1"/>
+      </a:gradFill>
+      <a:gradFill rotWithShape="1">
+        <a:gsLst>
+          <a:gs pos="0">
+            <a:schemeClr val="phClr">
+              <a:shade val="51000"/>
+              <a:satMod val="130000"/>
+            </a:schemeClr>
+          </a:gs>
+          <a:gs pos="80000">
+            <a:schemeClr val="phClr">
+              <a:shade val="93000"/>
+              <a:satMod val="130000"/>
+            </a:schemeClr>
+          </a:gs>
+          <a:gs pos="100000">
+            <a:schemeClr val="phClr">
+              <a:shade val="94000"/>
+              <a:satMod val="135000"/>
+            </a:schemeClr>
+          </a:gs>
+        </a:gsLst>
+        <a:lin ang="16200000" scaled="0"/>
+      </a:gradFill>
+    </a:fillStyleLst>
+    <a:lnStyleLst>
+      <a:ln w="9525" cap="flat" cmpd="sng" algn="ctr">
+        <a:solidFill>
+          <a:schemeClr val="phClr">
+            <a:shade val="95000"/>
+            <a:satMod val="105000"/>
+          </a:schemeClr>
+        </a:solidFill>
+        <a:prstDash val="solid"/>
+      </a:ln>
+      <a:ln w="25400" cap="flat" cmpd="sng" algn="ctr">
+        <a:solidFill>
+          <a:schemeClr val="phClr"/>
+        </a:solidFill>
+        <a:prstDash val="solid"/>
+      </a:ln>
+      <a:ln w="38100" cap="flat" cmpd="sng" algn="ctr">
+        <a:solidFill>
+          <a:schemeClr val="phClr"/>
+        </a:solidFill>
+        <a:prstDash val="solid"/>
+      </a:ln>
+    </a:lnStyleLst>
+    <a:effectStyleLst>
+      <a:effectStyle>
+        <a:effectLst>
+          <a:outerShdw blurRad="40000" dist="20000" dir="5400000" rotWithShape="0">
+            <a:srgbClr val="000000">
+              <a:alpha val="38000"/>
+            </a:srgbClr>
+          </a:outerShdw>
+        </a:effectLst>
+      </a:effectStyle>
+      <a:effectStyle>
+        <a:effectLst>
+          <a:outerShdw blurRad="40000" dist="23000" dir="5400000" rotWithShape="0">
+            <a:srgbClr val="000000">
+              <a:alpha val="35000"/>
+            </a:srgbClr>
+          </a:outerShdw>
+        </a:effectLst>
+      </a:effectStyle>
+      <a:effectStyle>
+        <a:effectLst>
+          <a:outerShdw blurRad="40000" dist="23000" dir="5400000" rotWithShape="0">
+            <a:srgbClr val="000000">
+              <a:alpha val="35000"/>
+            </a:srgbClr>
+          </a:outerShdw>
+        </a:effectLst>
+        <a:scene3d>
+          <a:camera prst="orthographicFront">
+            <a:rot lat="0" lon="0" rev="0"/>
+          </a:camera>
+          <a:lightRig rig="threePt" dir="t">
+            <a:rot lat="0" lon="0" rev="1200000"/>
+          </a:lightRig>
+        </a:scene3d>
+        <a:sp3d>
+          <a:bevelT w="63500" h="25400"/>
+        </a:sp3d>
+      </a:effectStyle>
+    </a:effectStyleLst>
+    <a:bgFillStyleLst>
+      <a:solidFill>
+        <a:schemeClr val="phClr"/>
+      </a:solidFill>
+      <a:gradFill rotWithShape="1">
+        <a:gsLst>
+          <a:gs pos="0">
+            <a:schemeClr val="phClr">
+              <a:tint val="40000"/>
+              <a:satMod val="350000"/>
+            </a:schemeClr>
+          </a:gs>
+          <a:gs pos="40000">
+            <a:schemeClr val="phClr">
+              <a:tint val="45000"/>
+              <a:shade val="99000"/>
+              <a:satMod val="350000"/>
+            </a:schemeClr>
+          </a:gs>
+          <a:gs pos="100000">
+            <a:schemeClr val="phClr">
+              <a:shade val="20000"/>
+              <a:satMod val="255000"/>
+            </a:schemeClr>
+          </a:gs>
+        </a:gsLst>
+        <a:path path="circle">
+          <a:fillToRect l="50000" t="-80000" r="50000" b="180000"/>
+        </a:path>
+      </a:gradFill>
+      <a:gradFill rotWithShape="1">
+        <a:gsLst>
+          <a:gs pos="0">
+            <a:schemeClr val="phClr">
+              <a:tint val="80000"/>
+              <a:satMod val="300000"/>
+            </a:schemeClr>
+          </a:gs>
+          <a:gs pos="100000">
+            <a:schemeClr val="phClr">
+              <a:shade val="30000"/>
+              <a:satMod val="200000"/>
+            </a:schemeClr>
+          </a:gs>
+        </a:gsLst>
+        <a:path path="circle">
+          <a:fillToRect l="50000" t="50000" r="50000" b="50000"/>
+        </a:path>
+      </a:gradFill>
+    </a:bgFillStyleLst>
+  </a:fmtScheme>
+</a:themeOverride>
+</file>
+
+<file path=ppt/theme/themeOverride11.xml><?xml version="1.0" encoding="utf-8"?>
 <a:themeOverride xmlns:a="http://schemas.openxmlformats.org/drawingml/2006/main">
   <a:clrScheme name="Grattan">
     <a:dk1>
@@ -17383,4 +19987,225 @@
     </a:bgFillStyleLst>
   </a:fmtScheme>
 </a:themeOverride>
+</file>
+
+<file path=ppt/theme/themeOverride9.xml><?xml version="1.0" encoding="utf-8"?>
+<a:themeOverride xmlns:a="http://schemas.openxmlformats.org/drawingml/2006/main">
+  <a:clrScheme name="Grattan">
+    <a:dk1>
+      <a:srgbClr val="000000"/>
+    </a:dk1>
+    <a:lt1>
+      <a:srgbClr val="FFFFFF"/>
+    </a:lt1>
+    <a:dk2>
+      <a:srgbClr val="A02226"/>
+    </a:dk2>
+    <a:lt2>
+      <a:srgbClr val="621214"/>
+    </a:lt2>
+    <a:accent1>
+      <a:srgbClr val="D4582A"/>
+    </a:accent1>
+    <a:accent2>
+      <a:srgbClr val="F68B33"/>
+    </a:accent2>
+    <a:accent3>
+      <a:srgbClr val="FFC35A"/>
+    </a:accent3>
+    <a:accent4>
+      <a:srgbClr val="FFE07F"/>
+    </a:accent4>
+    <a:accent5>
+      <a:srgbClr val="F3901D"/>
+    </a:accent5>
+    <a:accent6>
+      <a:srgbClr val="6A737B"/>
+    </a:accent6>
+    <a:hlink>
+      <a:srgbClr val="757575"/>
+    </a:hlink>
+    <a:folHlink>
+      <a:srgbClr val="AEAEAE"/>
+    </a:folHlink>
+  </a:clrScheme>
+  <a:fontScheme name="Blank Presentation">
+    <a:majorFont>
+      <a:latin typeface="Arial"/>
+      <a:ea typeface="ＭＳ Ｐゴシック"/>
+      <a:cs typeface=""/>
+    </a:majorFont>
+    <a:minorFont>
+      <a:latin typeface="Arial"/>
+      <a:ea typeface="ＭＳ Ｐゴシック"/>
+      <a:cs typeface=""/>
+    </a:minorFont>
+  </a:fontScheme>
+  <a:fmtScheme name="Office">
+    <a:fillStyleLst>
+      <a:solidFill>
+        <a:schemeClr val="phClr"/>
+      </a:solidFill>
+      <a:gradFill rotWithShape="1">
+        <a:gsLst>
+          <a:gs pos="0">
+            <a:schemeClr val="phClr">
+              <a:tint val="50000"/>
+              <a:satMod val="300000"/>
+            </a:schemeClr>
+          </a:gs>
+          <a:gs pos="35000">
+            <a:schemeClr val="phClr">
+              <a:tint val="37000"/>
+              <a:satMod val="300000"/>
+            </a:schemeClr>
+          </a:gs>
+          <a:gs pos="100000">
+            <a:schemeClr val="phClr">
+              <a:tint val="15000"/>
+              <a:satMod val="350000"/>
+            </a:schemeClr>
+          </a:gs>
+        </a:gsLst>
+        <a:lin ang="16200000" scaled="1"/>
+      </a:gradFill>
+      <a:gradFill rotWithShape="1">
+        <a:gsLst>
+          <a:gs pos="0">
+            <a:schemeClr val="phClr">
+              <a:shade val="51000"/>
+              <a:satMod val="130000"/>
+            </a:schemeClr>
+          </a:gs>
+          <a:gs pos="80000">
+            <a:schemeClr val="phClr">
+              <a:shade val="93000"/>
+              <a:satMod val="130000"/>
+            </a:schemeClr>
+          </a:gs>
+          <a:gs pos="100000">
+            <a:schemeClr val="phClr">
+              <a:shade val="94000"/>
+              <a:satMod val="135000"/>
+            </a:schemeClr>
+          </a:gs>
+        </a:gsLst>
+        <a:lin ang="16200000" scaled="0"/>
+      </a:gradFill>
+    </a:fillStyleLst>
+    <a:lnStyleLst>
+      <a:ln w="9525" cap="flat" cmpd="sng" algn="ctr">
+        <a:solidFill>
+          <a:schemeClr val="phClr">
+            <a:shade val="95000"/>
+            <a:satMod val="105000"/>
+          </a:schemeClr>
+        </a:solidFill>
+        <a:prstDash val="solid"/>
+      </a:ln>
+      <a:ln w="25400" cap="flat" cmpd="sng" algn="ctr">
+        <a:solidFill>
+          <a:schemeClr val="phClr"/>
+        </a:solidFill>
+        <a:prstDash val="solid"/>
+      </a:ln>
+      <a:ln w="38100" cap="flat" cmpd="sng" algn="ctr">
+        <a:solidFill>
+          <a:schemeClr val="phClr"/>
+        </a:solidFill>
+        <a:prstDash val="solid"/>
+      </a:ln>
+    </a:lnStyleLst>
+    <a:effectStyleLst>
+      <a:effectStyle>
+        <a:effectLst>
+          <a:outerShdw blurRad="40000" dist="20000" dir="5400000" rotWithShape="0">
+            <a:srgbClr val="000000">
+              <a:alpha val="38000"/>
+            </a:srgbClr>
+          </a:outerShdw>
+        </a:effectLst>
+      </a:effectStyle>
+      <a:effectStyle>
+        <a:effectLst>
+          <a:outerShdw blurRad="40000" dist="23000" dir="5400000" rotWithShape="0">
+            <a:srgbClr val="000000">
+              <a:alpha val="35000"/>
+            </a:srgbClr>
+          </a:outerShdw>
+        </a:effectLst>
+      </a:effectStyle>
+      <a:effectStyle>
+        <a:effectLst>
+          <a:outerShdw blurRad="40000" dist="23000" dir="5400000" rotWithShape="0">
+            <a:srgbClr val="000000">
+              <a:alpha val="35000"/>
+            </a:srgbClr>
+          </a:outerShdw>
+        </a:effectLst>
+        <a:scene3d>
+          <a:camera prst="orthographicFront">
+            <a:rot lat="0" lon="0" rev="0"/>
+          </a:camera>
+          <a:lightRig rig="threePt" dir="t">
+            <a:rot lat="0" lon="0" rev="1200000"/>
+          </a:lightRig>
+        </a:scene3d>
+        <a:sp3d>
+          <a:bevelT w="63500" h="25400"/>
+        </a:sp3d>
+      </a:effectStyle>
+    </a:effectStyleLst>
+    <a:bgFillStyleLst>
+      <a:solidFill>
+        <a:schemeClr val="phClr"/>
+      </a:solidFill>
+      <a:gradFill rotWithShape="1">
+        <a:gsLst>
+          <a:gs pos="0">
+            <a:schemeClr val="phClr">
+              <a:tint val="40000"/>
+              <a:satMod val="350000"/>
+            </a:schemeClr>
+          </a:gs>
+          <a:gs pos="40000">
+            <a:schemeClr val="phClr">
+              <a:tint val="45000"/>
+              <a:shade val="99000"/>
+              <a:satMod val="350000"/>
+            </a:schemeClr>
+          </a:gs>
+          <a:gs pos="100000">
+            <a:schemeClr val="phClr">
+              <a:shade val="20000"/>
+              <a:satMod val="255000"/>
+            </a:schemeClr>
+          </a:gs>
+        </a:gsLst>
+        <a:path path="circle">
+          <a:fillToRect l="50000" t="-80000" r="50000" b="180000"/>
+        </a:path>
+      </a:gradFill>
+      <a:gradFill rotWithShape="1">
+        <a:gsLst>
+          <a:gs pos="0">
+            <a:schemeClr val="phClr">
+              <a:tint val="80000"/>
+              <a:satMod val="300000"/>
+            </a:schemeClr>
+          </a:gs>
+          <a:gs pos="100000">
+            <a:schemeClr val="phClr">
+              <a:shade val="30000"/>
+              <a:satMod val="200000"/>
+            </a:schemeClr>
+          </a:gs>
+        </a:gsLst>
+        <a:path path="circle">
+          <a:fillToRect l="50000" t="50000" r="50000" b="50000"/>
+        </a:path>
+      </a:gradFill>
+    </a:bgFillStyleLst>
+  </a:fmtScheme>
+</a:themeOverride>
 </file>
</xml_diff>